<commit_message>
remove hardcoded subnet in viya/cas securitygroups
</commit_message>
<xml_diff>
--- a/doc/Quick Start architecture diagram.pptx
+++ b/doc/Quick Start architecture diagram.pptx
@@ -5,7 +5,7 @@
     <p:sldMasterId id="2147483648" r:id="rId1"/>
   </p:sldMasterIdLst>
   <p:sldIdLst>
-    <p:sldId id="256" r:id="rId2"/>
+    <p:sldId id="258" r:id="rId2"/>
   </p:sldIdLst>
   <p:sldSz cx="12192000" cy="6858000"/>
   <p:notesSz cx="6858000" cy="9144000"/>
@@ -243,7 +243,7 @@
           <a:p>
             <a:fld id="{5075756A-E1AA-F843-BF52-05C1433C8A91}" type="datetimeFigureOut">
               <a:rPr lang="en-US" smtClean="0"/>
-              <a:t>5/23/2017</a:t>
+              <a:t>8/11/2017</a:t>
             </a:fld>
             <a:endParaRPr lang="en-US"/>
           </a:p>
@@ -413,7 +413,7 @@
           <a:p>
             <a:fld id="{5075756A-E1AA-F843-BF52-05C1433C8A91}" type="datetimeFigureOut">
               <a:rPr lang="en-US" smtClean="0"/>
-              <a:t>5/23/2017</a:t>
+              <a:t>8/11/2017</a:t>
             </a:fld>
             <a:endParaRPr lang="en-US"/>
           </a:p>
@@ -593,7 +593,7 @@
           <a:p>
             <a:fld id="{5075756A-E1AA-F843-BF52-05C1433C8A91}" type="datetimeFigureOut">
               <a:rPr lang="en-US" smtClean="0"/>
-              <a:t>5/23/2017</a:t>
+              <a:t>8/11/2017</a:t>
             </a:fld>
             <a:endParaRPr lang="en-US"/>
           </a:p>
@@ -763,7 +763,7 @@
           <a:p>
             <a:fld id="{5075756A-E1AA-F843-BF52-05C1433C8A91}" type="datetimeFigureOut">
               <a:rPr lang="en-US" smtClean="0"/>
-              <a:t>5/23/2017</a:t>
+              <a:t>8/11/2017</a:t>
             </a:fld>
             <a:endParaRPr lang="en-US"/>
           </a:p>
@@ -1009,7 +1009,7 @@
           <a:p>
             <a:fld id="{5075756A-E1AA-F843-BF52-05C1433C8A91}" type="datetimeFigureOut">
               <a:rPr lang="en-US" smtClean="0"/>
-              <a:t>5/23/2017</a:t>
+              <a:t>8/11/2017</a:t>
             </a:fld>
             <a:endParaRPr lang="en-US"/>
           </a:p>
@@ -1241,7 +1241,7 @@
           <a:p>
             <a:fld id="{5075756A-E1AA-F843-BF52-05C1433C8A91}" type="datetimeFigureOut">
               <a:rPr lang="en-US" smtClean="0"/>
-              <a:t>5/23/2017</a:t>
+              <a:t>8/11/2017</a:t>
             </a:fld>
             <a:endParaRPr lang="en-US"/>
           </a:p>
@@ -1608,7 +1608,7 @@
           <a:p>
             <a:fld id="{5075756A-E1AA-F843-BF52-05C1433C8A91}" type="datetimeFigureOut">
               <a:rPr lang="en-US" smtClean="0"/>
-              <a:t>5/23/2017</a:t>
+              <a:t>8/11/2017</a:t>
             </a:fld>
             <a:endParaRPr lang="en-US"/>
           </a:p>
@@ -1726,7 +1726,7 @@
           <a:p>
             <a:fld id="{5075756A-E1AA-F843-BF52-05C1433C8A91}" type="datetimeFigureOut">
               <a:rPr lang="en-US" smtClean="0"/>
-              <a:t>5/23/2017</a:t>
+              <a:t>8/11/2017</a:t>
             </a:fld>
             <a:endParaRPr lang="en-US"/>
           </a:p>
@@ -1821,7 +1821,7 @@
           <a:p>
             <a:fld id="{5075756A-E1AA-F843-BF52-05C1433C8A91}" type="datetimeFigureOut">
               <a:rPr lang="en-US" smtClean="0"/>
-              <a:t>5/23/2017</a:t>
+              <a:t>8/11/2017</a:t>
             </a:fld>
             <a:endParaRPr lang="en-US"/>
           </a:p>
@@ -2098,7 +2098,7 @@
           <a:p>
             <a:fld id="{5075756A-E1AA-F843-BF52-05C1433C8A91}" type="datetimeFigureOut">
               <a:rPr lang="en-US" smtClean="0"/>
-              <a:t>5/23/2017</a:t>
+              <a:t>8/11/2017</a:t>
             </a:fld>
             <a:endParaRPr lang="en-US"/>
           </a:p>
@@ -2351,7 +2351,7 @@
           <a:p>
             <a:fld id="{5075756A-E1AA-F843-BF52-05C1433C8A91}" type="datetimeFigureOut">
               <a:rPr lang="en-US" smtClean="0"/>
-              <a:t>5/23/2017</a:t>
+              <a:t>8/11/2017</a:t>
             </a:fld>
             <a:endParaRPr lang="en-US"/>
           </a:p>
@@ -2564,7 +2564,7 @@
           <a:p>
             <a:fld id="{5075756A-E1AA-F843-BF52-05C1433C8A91}" type="datetimeFigureOut">
               <a:rPr lang="en-US" smtClean="0"/>
-              <a:t>5/23/2017</a:t>
+              <a:t>8/11/2017</a:t>
             </a:fld>
             <a:endParaRPr lang="en-US"/>
           </a:p>
@@ -2977,7 +2977,7 @@
         </p:nvGrpSpPr>
         <p:grpSpPr>
           <a:xfrm>
-            <a:off x="1871663" y="243293"/>
+            <a:off x="1845568" y="144242"/>
             <a:ext cx="9346233" cy="6524300"/>
             <a:chOff x="1871664" y="243294"/>
             <a:chExt cx="8676930" cy="6099535"/>
@@ -2992,7 +2992,7 @@
           <p:spPr>
             <a:xfrm>
               <a:off x="2173415" y="1029020"/>
-              <a:ext cx="7262816" cy="4759183"/>
+              <a:ext cx="4447246" cy="4759183"/>
             </a:xfrm>
             <a:prstGeom prst="roundRect">
               <a:avLst>
@@ -3045,72 +3045,6 @@
                 </a:solidFill>
                 <a:latin typeface="Arial"/>
                 <a:cs typeface="Arial"/>
-              </a:endParaRPr>
-            </a:p>
-          </p:txBody>
-        </p:sp>
-        <p:sp>
-          <p:nvSpPr>
-            <p:cNvPr id="14" name="Rounded Rectangle 13"/>
-            <p:cNvSpPr/>
-            <p:nvPr/>
-          </p:nvSpPr>
-          <p:spPr>
-            <a:xfrm>
-              <a:off x="6026151" y="637250"/>
-              <a:ext cx="3131549" cy="5486048"/>
-            </a:xfrm>
-            <a:prstGeom prst="roundRect">
-              <a:avLst>
-                <a:gd name="adj" fmla="val 9818"/>
-              </a:avLst>
-            </a:prstGeom>
-            <a:solidFill>
-              <a:srgbClr val="FFE9CF">
-                <a:alpha val="40000"/>
-              </a:srgbClr>
-            </a:solidFill>
-            <a:ln w="19050">
-              <a:solidFill>
-                <a:srgbClr val="F7981F"/>
-              </a:solidFill>
-              <a:prstDash val="lgDash"/>
-            </a:ln>
-            <a:effectLst/>
-          </p:spPr>
-          <p:style>
-            <a:lnRef idx="1">
-              <a:schemeClr val="accent1"/>
-            </a:lnRef>
-            <a:fillRef idx="3">
-              <a:schemeClr val="accent1"/>
-            </a:fillRef>
-            <a:effectRef idx="2">
-              <a:schemeClr val="accent1"/>
-            </a:effectRef>
-            <a:fontRef idx="minor">
-              <a:schemeClr val="lt1"/>
-            </a:fontRef>
-          </p:style>
-          <p:txBody>
-            <a:bodyPr anchor="ctr"/>
-            <a:lstStyle/>
-            <a:p>
-              <a:pPr algn="ctr" fontAlgn="auto">
-                <a:spcBef>
-                  <a:spcPts val="0"/>
-                </a:spcBef>
-                <a:spcAft>
-                  <a:spcPts val="0"/>
-                </a:spcAft>
-                <a:defRPr/>
-              </a:pPr>
-              <a:endParaRPr lang="en-US" sz="1400" dirty="0">
-                <a:solidFill>
-                  <a:schemeClr val="tx1"/>
-                </a:solidFill>
-                <a:latin typeface="Helvetica Neue"/>
-                <a:cs typeface="Helvetica Neue"/>
               </a:endParaRPr>
             </a:p>
           </p:txBody>
@@ -3328,8 +3262,8 @@
           </p:nvSpPr>
           <p:spPr>
             <a:xfrm>
-              <a:off x="2776286" y="1391274"/>
-              <a:ext cx="2589798" cy="1917181"/>
+              <a:off x="2816482" y="1420540"/>
+              <a:ext cx="2589798" cy="1703348"/>
             </a:xfrm>
             <a:prstGeom prst="roundRect">
               <a:avLst>
@@ -3392,136 +3326,8 @@
           </p:nvSpPr>
           <p:spPr>
             <a:xfrm>
-              <a:off x="2746041" y="3575416"/>
-              <a:ext cx="2589798" cy="1966671"/>
-            </a:xfrm>
-            <a:prstGeom prst="roundRect">
-              <a:avLst>
-                <a:gd name="adj" fmla="val 9818"/>
-              </a:avLst>
-            </a:prstGeom>
-            <a:solidFill>
-              <a:srgbClr val="CBD5E9"/>
-            </a:solidFill>
-            <a:ln w="6350">
-              <a:solidFill>
-                <a:schemeClr val="tx1"/>
-              </a:solidFill>
-              <a:prstDash val="solid"/>
-            </a:ln>
-            <a:effectLst/>
-          </p:spPr>
-          <p:style>
-            <a:lnRef idx="1">
-              <a:schemeClr val="accent1"/>
-            </a:lnRef>
-            <a:fillRef idx="3">
-              <a:schemeClr val="accent1"/>
-            </a:fillRef>
-            <a:effectRef idx="2">
-              <a:schemeClr val="accent1"/>
-            </a:effectRef>
-            <a:fontRef idx="minor">
-              <a:schemeClr val="lt1"/>
-            </a:fontRef>
-          </p:style>
-          <p:txBody>
-            <a:bodyPr anchor="ctr"/>
-            <a:lstStyle/>
-            <a:p>
-              <a:pPr algn="ctr" fontAlgn="auto">
-                <a:spcBef>
-                  <a:spcPts val="0"/>
-                </a:spcBef>
-                <a:spcAft>
-                  <a:spcPts val="0"/>
-                </a:spcAft>
-                <a:defRPr/>
-              </a:pPr>
-              <a:endParaRPr lang="en-US" sz="1400" dirty="0">
-                <a:solidFill>
-                  <a:schemeClr val="tx1"/>
-                </a:solidFill>
-                <a:latin typeface="Helvetica Neue"/>
-                <a:cs typeface="Helvetica Neue"/>
-              </a:endParaRPr>
-            </a:p>
-          </p:txBody>
-        </p:sp>
-        <p:sp>
-          <p:nvSpPr>
-            <p:cNvPr id="17" name="Rounded Rectangle 16"/>
-            <p:cNvSpPr/>
-            <p:nvPr/>
-          </p:nvSpPr>
-          <p:spPr>
-            <a:xfrm>
-              <a:off x="6281904" y="1431558"/>
-              <a:ext cx="2589798" cy="1856730"/>
-            </a:xfrm>
-            <a:prstGeom prst="roundRect">
-              <a:avLst>
-                <a:gd name="adj" fmla="val 9818"/>
-              </a:avLst>
-            </a:prstGeom>
-            <a:solidFill>
-              <a:srgbClr val="D2D9CA"/>
-            </a:solidFill>
-            <a:ln w="6350">
-              <a:solidFill>
-                <a:schemeClr val="tx1"/>
-              </a:solidFill>
-              <a:prstDash val="solid"/>
-            </a:ln>
-            <a:effectLst/>
-          </p:spPr>
-          <p:style>
-            <a:lnRef idx="1">
-              <a:schemeClr val="accent1"/>
-            </a:lnRef>
-            <a:fillRef idx="3">
-              <a:schemeClr val="accent1"/>
-            </a:fillRef>
-            <a:effectRef idx="2">
-              <a:schemeClr val="accent1"/>
-            </a:effectRef>
-            <a:fontRef idx="minor">
-              <a:schemeClr val="lt1"/>
-            </a:fontRef>
-          </p:style>
-          <p:txBody>
-            <a:bodyPr anchor="ctr"/>
-            <a:lstStyle/>
-            <a:p>
-              <a:pPr algn="ctr" fontAlgn="auto">
-                <a:spcBef>
-                  <a:spcPts val="0"/>
-                </a:spcBef>
-                <a:spcAft>
-                  <a:spcPts val="0"/>
-                </a:spcAft>
-                <a:defRPr/>
-              </a:pPr>
-              <a:endParaRPr lang="en-US" sz="1400" dirty="0">
-                <a:solidFill>
-                  <a:schemeClr val="tx1"/>
-                </a:solidFill>
-                <a:latin typeface="Helvetica Neue"/>
-                <a:cs typeface="Helvetica Neue"/>
-              </a:endParaRPr>
-            </a:p>
-          </p:txBody>
-        </p:sp>
-        <p:sp>
-          <p:nvSpPr>
-            <p:cNvPr id="18" name="Rounded Rectangle 17"/>
-            <p:cNvSpPr/>
-            <p:nvPr/>
-          </p:nvSpPr>
-          <p:spPr>
-            <a:xfrm>
-              <a:off x="6251659" y="3575416"/>
-              <a:ext cx="2589798" cy="1966669"/>
+              <a:off x="2746041" y="3200533"/>
+              <a:ext cx="2589798" cy="2341554"/>
             </a:xfrm>
             <a:prstGeom prst="roundRect">
               <a:avLst>
@@ -3598,7 +3404,7 @@
           </p:blipFill>
           <p:spPr>
             <a:xfrm>
-              <a:off x="5534386" y="653132"/>
+              <a:off x="5606178" y="750603"/>
               <a:ext cx="538196" cy="564238"/>
             </a:xfrm>
             <a:prstGeom prst="rect">
@@ -3674,17 +3480,6 @@
             <a:lstStyle/>
             <a:p>
               <a:pPr algn="ctr"/>
-              <a:r>
-                <a:rPr lang="en-US" sz="1100" b="1" dirty="0" smtClean="0">
-                  <a:solidFill>
-                    <a:srgbClr val="FAA634"/>
-                  </a:solidFill>
-                  <a:latin typeface="Verdana" panose="020B0604030504040204" pitchFamily="34" charset="0"/>
-                  <a:ea typeface="Verdana" panose="020B0604030504040204" pitchFamily="34" charset="0"/>
-                  <a:cs typeface="Verdana" panose="020B0604030504040204" pitchFamily="34" charset="0"/>
-                </a:rPr>
-                <a:t>Availability Zone 2</a:t>
-              </a:r>
               <a:endParaRPr lang="en-US" sz="1100" b="1" dirty="0">
                 <a:solidFill>
                   <a:srgbClr val="FAA634"/>
@@ -3704,7 +3499,7 @@
           </p:nvSpPr>
           <p:spPr>
             <a:xfrm>
-              <a:off x="5250233" y="1208571"/>
+              <a:off x="6234787" y="828130"/>
               <a:ext cx="1170948" cy="182703"/>
             </a:xfrm>
             <a:prstGeom prst="rect">
@@ -3796,30 +3591,6 @@
       </p:pic>
       <p:pic>
         <p:nvPicPr>
-          <p:cNvPr id="69" name="Picture 68"/>
-          <p:cNvPicPr>
-            <a:picLocks noChangeAspect="1"/>
-          </p:cNvPicPr>
-          <p:nvPr/>
-        </p:nvPicPr>
-        <p:blipFill>
-          <a:blip r:embed="rId5"/>
-          <a:stretch>
-            <a:fillRect/>
-          </a:stretch>
-        </p:blipFill>
-        <p:spPr>
-          <a:xfrm>
-            <a:off x="6731815" y="3620494"/>
-            <a:ext cx="215900" cy="241300"/>
-          </a:xfrm>
-          <a:prstGeom prst="rect">
-            <a:avLst/>
-          </a:prstGeom>
-        </p:spPr>
-      </p:pic>
-      <p:pic>
-        <p:nvPicPr>
           <p:cNvPr id="70" name="Picture 69"/>
           <p:cNvPicPr>
             <a:picLocks noChangeAspect="1"/>
@@ -3842,30 +3613,6 @@
           </a:prstGeom>
         </p:spPr>
       </p:pic>
-      <p:pic>
-        <p:nvPicPr>
-          <p:cNvPr id="71" name="Picture 70"/>
-          <p:cNvPicPr>
-            <a:picLocks noChangeAspect="1"/>
-          </p:cNvPicPr>
-          <p:nvPr/>
-        </p:nvPicPr>
-        <p:blipFill>
-          <a:blip r:embed="rId5"/>
-          <a:stretch>
-            <a:fillRect/>
-          </a:stretch>
-        </p:blipFill>
-        <p:spPr>
-          <a:xfrm>
-            <a:off x="6731815" y="1343207"/>
-            <a:ext cx="215900" cy="241300"/>
-          </a:xfrm>
-          <a:prstGeom prst="rect">
-            <a:avLst/>
-          </a:prstGeom>
-        </p:spPr>
-      </p:pic>
       <p:sp>
         <p:nvSpPr>
           <p:cNvPr id="72" name="TextBox 33"/>
@@ -3876,7 +3623,7 @@
         </p:nvSpPr>
         <p:spPr bwMode="auto">
           <a:xfrm>
-            <a:off x="4805536" y="5930774"/>
+            <a:off x="4755254" y="5847062"/>
             <a:ext cx="2602462" cy="246221"/>
           </a:xfrm>
           <a:prstGeom prst="rect">
@@ -3919,7 +3666,7 @@
       </p:sp>
       <p:pic>
         <p:nvPicPr>
-          <p:cNvPr id="73" name="Picture 72"/>
+          <p:cNvPr id="75" name="Picture 74"/>
           <p:cNvPicPr>
             <a:picLocks noChangeAspect="1"/>
           </p:cNvPicPr>
@@ -3927,85 +3674,6 @@
         </p:nvPicPr>
         <p:blipFill>
           <a:blip r:embed="rId6">
-            <a:extLst>
-              <a:ext uri="{28A0092B-C50C-407E-A947-70E740481C1C}">
-                <a14:useLocalDpi xmlns:a14="http://schemas.microsoft.com/office/drawing/2010/main" val="0"/>
-              </a:ext>
-            </a:extLst>
-          </a:blip>
-          <a:stretch>
-            <a:fillRect/>
-          </a:stretch>
-        </p:blipFill>
-        <p:spPr>
-          <a:xfrm>
-            <a:off x="10322791" y="3207965"/>
-            <a:ext cx="537318" cy="638065"/>
-          </a:xfrm>
-          <a:prstGeom prst="rect">
-            <a:avLst/>
-          </a:prstGeom>
-        </p:spPr>
-      </p:pic>
-      <p:sp>
-        <p:nvSpPr>
-          <p:cNvPr id="74" name="TextBox 73"/>
-          <p:cNvSpPr txBox="1"/>
-          <p:nvPr/>
-        </p:nvSpPr>
-        <p:spPr>
-          <a:xfrm>
-            <a:off x="10225690" y="3885046"/>
-            <a:ext cx="731520" cy="155632"/>
-          </a:xfrm>
-          <a:prstGeom prst="rect">
-            <a:avLst/>
-          </a:prstGeom>
-          <a:noFill/>
-        </p:spPr>
-        <p:txBody>
-          <a:bodyPr wrap="square" lIns="0" tIns="0" rIns="0" bIns="0" rtlCol="0" anchor="t">
-            <a:noAutofit/>
-          </a:bodyPr>
-          <a:lstStyle/>
-          <a:p>
-            <a:pPr algn="ctr"/>
-            <a:r>
-              <a:rPr lang="en-US" sz="1000" b="1" dirty="0">
-                <a:latin typeface="Verdana" panose="020B0604030504040204" pitchFamily="34" charset="0"/>
-                <a:ea typeface="Verdana" panose="020B0604030504040204" pitchFamily="34" charset="0"/>
-                <a:cs typeface="Verdana" panose="020B0604030504040204" pitchFamily="34" charset="0"/>
-              </a:rPr>
-              <a:t>Amazon</a:t>
-            </a:r>
-            <a:br>
-              <a:rPr lang="en-US" sz="1000" b="1" dirty="0">
-                <a:latin typeface="Verdana" panose="020B0604030504040204" pitchFamily="34" charset="0"/>
-                <a:ea typeface="Verdana" panose="020B0604030504040204" pitchFamily="34" charset="0"/>
-                <a:cs typeface="Verdana" panose="020B0604030504040204" pitchFamily="34" charset="0"/>
-              </a:rPr>
-            </a:br>
-            <a:r>
-              <a:rPr lang="en-US" sz="1000" b="1" dirty="0">
-                <a:latin typeface="Verdana" panose="020B0604030504040204" pitchFamily="34" charset="0"/>
-                <a:ea typeface="Verdana" panose="020B0604030504040204" pitchFamily="34" charset="0"/>
-                <a:cs typeface="Verdana" panose="020B0604030504040204" pitchFamily="34" charset="0"/>
-              </a:rPr>
-              <a:t>Route 53</a:t>
-            </a:r>
-          </a:p>
-        </p:txBody>
-      </p:sp>
-      <p:pic>
-        <p:nvPicPr>
-          <p:cNvPr id="75" name="Picture 74"/>
-          <p:cNvPicPr>
-            <a:picLocks noChangeAspect="1"/>
-          </p:cNvPicPr>
-          <p:nvPr/>
-        </p:nvPicPr>
-        <p:blipFill>
-          <a:blip r:embed="rId7">
             <a:extLst>
               <a:ext uri="{28A0092B-C50C-407E-A947-70E740481C1C}">
                 <a14:useLocalDpi xmlns:a14="http://schemas.microsoft.com/office/drawing/2010/main" val="0"/>
@@ -4080,165 +3748,113 @@
           </a:p>
         </p:txBody>
       </p:sp>
-      <p:sp>
-        <p:nvSpPr>
-          <p:cNvPr id="85" name="TextBox 84"/>
-          <p:cNvSpPr txBox="1"/>
+      <p:grpSp>
+        <p:nvGrpSpPr>
+          <p:cNvPr id="6" name="Group 5"/>
+          <p:cNvGrpSpPr/>
           <p:nvPr/>
-        </p:nvSpPr>
-        <p:spPr>
+        </p:nvGrpSpPr>
+        <p:grpSpPr>
           <a:xfrm>
-            <a:off x="3137609" y="4687227"/>
-            <a:ext cx="1044070" cy="274320"/>
+            <a:off x="3169129" y="3475849"/>
+            <a:ext cx="1171148" cy="985987"/>
+            <a:chOff x="3021085" y="3949159"/>
+            <a:chExt cx="1171148" cy="985987"/>
           </a:xfrm>
-          <a:prstGeom prst="rect">
-            <a:avLst/>
-          </a:prstGeom>
-          <a:noFill/>
-        </p:spPr>
-        <p:txBody>
-          <a:bodyPr wrap="square" lIns="0" tIns="0" rIns="0" bIns="0" rtlCol="0" anchor="t">
-            <a:noAutofit/>
-          </a:bodyPr>
-          <a:lstStyle/>
-          <a:p>
-            <a:pPr algn="ctr"/>
-            <a:r>
-              <a:rPr lang="en-US" sz="1000" dirty="0" smtClean="0">
+        </p:grpSpPr>
+        <p:sp>
+          <p:nvSpPr>
+            <p:cNvPr id="85" name="TextBox 84"/>
+            <p:cNvSpPr txBox="1"/>
+            <p:nvPr/>
+          </p:nvSpPr>
+          <p:spPr>
+            <a:xfrm>
+              <a:off x="3021085" y="4581532"/>
+              <a:ext cx="1171148" cy="353614"/>
+            </a:xfrm>
+            <a:prstGeom prst="rect">
+              <a:avLst/>
+            </a:prstGeom>
+            <a:noFill/>
+          </p:spPr>
+          <p:txBody>
+            <a:bodyPr wrap="square" lIns="0" tIns="0" rIns="0" bIns="0" rtlCol="0" anchor="t">
+              <a:noAutofit/>
+            </a:bodyPr>
+            <a:lstStyle/>
+            <a:p>
+              <a:pPr algn="ctr"/>
+              <a:r>
+                <a:rPr lang="en-US" sz="1000" b="1" dirty="0" err="1" smtClean="0">
+                  <a:latin typeface="Verdana" panose="020B0604030504040204" pitchFamily="34" charset="0"/>
+                  <a:ea typeface="Verdana" panose="020B0604030504040204" pitchFamily="34" charset="0"/>
+                  <a:cs typeface="Verdana" panose="020B0604030504040204" pitchFamily="34" charset="0"/>
+                </a:rPr>
+                <a:t>Viya</a:t>
+              </a:r>
+              <a:r>
+                <a:rPr lang="en-US" sz="1000" b="1" dirty="0" smtClean="0">
+                  <a:latin typeface="Verdana" panose="020B0604030504040204" pitchFamily="34" charset="0"/>
+                  <a:ea typeface="Verdana" panose="020B0604030504040204" pitchFamily="34" charset="0"/>
+                  <a:cs typeface="Verdana" panose="020B0604030504040204" pitchFamily="34" charset="0"/>
+                </a:rPr>
+                <a:t> Services /</a:t>
+              </a:r>
+              <a:br>
+                <a:rPr lang="en-US" sz="1000" b="1" dirty="0" smtClean="0">
+                  <a:latin typeface="Verdana" panose="020B0604030504040204" pitchFamily="34" charset="0"/>
+                  <a:ea typeface="Verdana" panose="020B0604030504040204" pitchFamily="34" charset="0"/>
+                  <a:cs typeface="Verdana" panose="020B0604030504040204" pitchFamily="34" charset="0"/>
+                </a:rPr>
+              </a:br>
+              <a:r>
+                <a:rPr lang="en-US" sz="1000" b="1" dirty="0" smtClean="0">
+                  <a:latin typeface="Verdana" panose="020B0604030504040204" pitchFamily="34" charset="0"/>
+                  <a:ea typeface="Verdana" panose="020B0604030504040204" pitchFamily="34" charset="0"/>
+                  <a:cs typeface="Verdana" panose="020B0604030504040204" pitchFamily="34" charset="0"/>
+                </a:rPr>
+                <a:t>SAS Studio</a:t>
+              </a:r>
+              <a:endParaRPr lang="en-US" sz="1000" b="1" dirty="0">
                 <a:latin typeface="Verdana" panose="020B0604030504040204" pitchFamily="34" charset="0"/>
                 <a:ea typeface="Verdana" panose="020B0604030504040204" pitchFamily="34" charset="0"/>
                 <a:cs typeface="Verdana" panose="020B0604030504040204" pitchFamily="34" charset="0"/>
-              </a:rPr>
-              <a:t>&lt;your product instances&gt;</a:t>
-            </a:r>
-            <a:endParaRPr lang="en-US" sz="1000" dirty="0">
-              <a:latin typeface="Verdana" panose="020B0604030504040204" pitchFamily="34" charset="0"/>
-              <a:ea typeface="Verdana" panose="020B0604030504040204" pitchFamily="34" charset="0"/>
-              <a:cs typeface="Verdana" panose="020B0604030504040204" pitchFamily="34" charset="0"/>
-            </a:endParaRPr>
-          </a:p>
-        </p:txBody>
-      </p:sp>
-      <p:pic>
-        <p:nvPicPr>
-          <p:cNvPr id="86" name="Picture 85"/>
-          <p:cNvPicPr>
-            <a:picLocks noChangeAspect="1"/>
-          </p:cNvPicPr>
-          <p:nvPr/>
-        </p:nvPicPr>
-        <p:blipFill>
-          <a:blip r:embed="rId8">
-            <a:extLst>
-              <a:ext uri="{28A0092B-C50C-407E-A947-70E740481C1C}">
-                <a14:useLocalDpi xmlns:a14="http://schemas.microsoft.com/office/drawing/2010/main" val="0"/>
-              </a:ext>
-            </a:extLst>
-          </a:blip>
-          <a:stretch>
-            <a:fillRect/>
-          </a:stretch>
-        </p:blipFill>
-        <p:spPr>
-          <a:xfrm>
-            <a:off x="3429000" y="4073489"/>
-            <a:ext cx="544782" cy="564959"/>
-          </a:xfrm>
-          <a:prstGeom prst="rect">
-            <a:avLst/>
-          </a:prstGeom>
-        </p:spPr>
-      </p:pic>
-      <p:pic>
-        <p:nvPicPr>
-          <p:cNvPr id="118" name="Picture 117"/>
-          <p:cNvPicPr>
-            <a:picLocks noChangeAspect="1"/>
-          </p:cNvPicPr>
-          <p:nvPr/>
-        </p:nvPicPr>
-        <p:blipFill>
-          <a:blip r:embed="rId8">
-            <a:extLst>
-              <a:ext uri="{28A0092B-C50C-407E-A947-70E740481C1C}">
-                <a14:useLocalDpi xmlns:a14="http://schemas.microsoft.com/office/drawing/2010/main" val="0"/>
-              </a:ext>
-            </a:extLst>
-          </a:blip>
-          <a:stretch>
-            <a:fillRect/>
-          </a:stretch>
-        </p:blipFill>
-        <p:spPr>
-          <a:xfrm>
-            <a:off x="4523187" y="4073489"/>
-            <a:ext cx="544782" cy="564959"/>
-          </a:xfrm>
-          <a:prstGeom prst="rect">
-            <a:avLst/>
-          </a:prstGeom>
-        </p:spPr>
-      </p:pic>
-      <p:pic>
-        <p:nvPicPr>
-          <p:cNvPr id="124" name="Picture 123"/>
-          <p:cNvPicPr>
-            <a:picLocks noChangeAspect="1"/>
-          </p:cNvPicPr>
-          <p:nvPr/>
-        </p:nvPicPr>
-        <p:blipFill>
-          <a:blip r:embed="rId8">
-            <a:extLst>
-              <a:ext uri="{28A0092B-C50C-407E-A947-70E740481C1C}">
-                <a14:useLocalDpi xmlns:a14="http://schemas.microsoft.com/office/drawing/2010/main" val="0"/>
-              </a:ext>
-            </a:extLst>
-          </a:blip>
-          <a:stretch>
-            <a:fillRect/>
-          </a:stretch>
-        </p:blipFill>
-        <p:spPr>
-          <a:xfrm>
-            <a:off x="7283447" y="4073489"/>
-            <a:ext cx="544782" cy="564959"/>
-          </a:xfrm>
-          <a:prstGeom prst="rect">
-            <a:avLst/>
-          </a:prstGeom>
-        </p:spPr>
-      </p:pic>
-      <p:pic>
-        <p:nvPicPr>
-          <p:cNvPr id="126" name="Picture 125"/>
-          <p:cNvPicPr>
-            <a:picLocks noChangeAspect="1"/>
-          </p:cNvPicPr>
-          <p:nvPr/>
-        </p:nvPicPr>
-        <p:blipFill>
-          <a:blip r:embed="rId8">
-            <a:extLst>
-              <a:ext uri="{28A0092B-C50C-407E-A947-70E740481C1C}">
-                <a14:useLocalDpi xmlns:a14="http://schemas.microsoft.com/office/drawing/2010/main" val="0"/>
-              </a:ext>
-            </a:extLst>
-          </a:blip>
-          <a:stretch>
-            <a:fillRect/>
-          </a:stretch>
-        </p:blipFill>
-        <p:spPr>
-          <a:xfrm>
-            <a:off x="8377634" y="4073489"/>
-            <a:ext cx="544782" cy="564959"/>
-          </a:xfrm>
-          <a:prstGeom prst="rect">
-            <a:avLst/>
-          </a:prstGeom>
-        </p:spPr>
-      </p:pic>
+              </a:endParaRPr>
+            </a:p>
+          </p:txBody>
+        </p:sp>
+        <p:pic>
+          <p:nvPicPr>
+            <p:cNvPr id="86" name="Picture 85"/>
+            <p:cNvPicPr>
+              <a:picLocks noChangeAspect="1"/>
+            </p:cNvPicPr>
+            <p:nvPr/>
+          </p:nvPicPr>
+          <p:blipFill>
+            <a:blip r:embed="rId7">
+              <a:extLst>
+                <a:ext uri="{28A0092B-C50C-407E-A947-70E740481C1C}">
+                  <a14:useLocalDpi xmlns:a14="http://schemas.microsoft.com/office/drawing/2010/main" val="0"/>
+                </a:ext>
+              </a:extLst>
+            </a:blip>
+            <a:stretch>
+              <a:fillRect/>
+            </a:stretch>
+          </p:blipFill>
+          <p:spPr>
+            <a:xfrm>
+              <a:off x="3222533" y="3949159"/>
+              <a:ext cx="544782" cy="564959"/>
+            </a:xfrm>
+            <a:prstGeom prst="rect">
+              <a:avLst/>
+            </a:prstGeom>
+          </p:spPr>
+        </p:pic>
+      </p:grpSp>
       <p:sp>
         <p:nvSpPr>
           <p:cNvPr id="128" name="TextBox 127"/>
@@ -4247,7 +3863,7 @@
         </p:nvSpPr>
         <p:spPr>
           <a:xfrm>
-            <a:off x="3711894" y="3092029"/>
+            <a:off x="3499201" y="2828833"/>
             <a:ext cx="1136861" cy="400110"/>
           </a:xfrm>
           <a:prstGeom prst="rect">
@@ -4291,63 +3907,13 @@
       </p:sp>
       <p:sp>
         <p:nvSpPr>
-          <p:cNvPr id="129" name="TextBox 128"/>
-          <p:cNvSpPr txBox="1"/>
-          <p:nvPr/>
-        </p:nvSpPr>
-        <p:spPr>
-          <a:xfrm>
-            <a:off x="7613000" y="3092029"/>
-            <a:ext cx="1147895" cy="400110"/>
-          </a:xfrm>
-          <a:prstGeom prst="rect">
-            <a:avLst/>
-          </a:prstGeom>
-          <a:noFill/>
-        </p:spPr>
-        <p:txBody>
-          <a:bodyPr wrap="square" rtlCol="0">
-            <a:spAutoFit/>
-          </a:bodyPr>
-          <a:lstStyle/>
-          <a:p>
-            <a:pPr algn="ctr"/>
-            <a:r>
-              <a:rPr lang="en-US" sz="1000" dirty="0" smtClean="0">
-                <a:latin typeface="Verdana" panose="020B0604030504040204" pitchFamily="34" charset="0"/>
-                <a:ea typeface="Verdana" panose="020B0604030504040204" pitchFamily="34" charset="0"/>
-                <a:cs typeface="Verdana" panose="020B0604030504040204" pitchFamily="34" charset="0"/>
-              </a:rPr>
-              <a:t>Public subnet</a:t>
-            </a:r>
-          </a:p>
-          <a:p>
-            <a:pPr algn="ctr"/>
-            <a:r>
-              <a:rPr lang="en-US" sz="1000" dirty="0" smtClean="0">
-                <a:latin typeface="Verdana" panose="020B0604030504040204" pitchFamily="34" charset="0"/>
-                <a:ea typeface="Verdana" panose="020B0604030504040204" pitchFamily="34" charset="0"/>
-                <a:cs typeface="Verdana" panose="020B0604030504040204" pitchFamily="34" charset="0"/>
-              </a:rPr>
-              <a:t>10.0.144.0/20</a:t>
-            </a:r>
-            <a:endParaRPr lang="en-US" sz="1000" dirty="0">
-              <a:latin typeface="Verdana" panose="020B0604030504040204" pitchFamily="34" charset="0"/>
-              <a:ea typeface="Verdana" panose="020B0604030504040204" pitchFamily="34" charset="0"/>
-              <a:cs typeface="Verdana" panose="020B0604030504040204" pitchFamily="34" charset="0"/>
-            </a:endParaRPr>
-          </a:p>
-        </p:txBody>
-      </p:sp>
-      <p:sp>
-        <p:nvSpPr>
           <p:cNvPr id="130" name="TextBox 129"/>
           <p:cNvSpPr txBox="1"/>
           <p:nvPr/>
         </p:nvSpPr>
         <p:spPr>
           <a:xfrm>
-            <a:off x="3674473" y="5488269"/>
+            <a:off x="3459304" y="5430230"/>
             <a:ext cx="1211702" cy="400110"/>
           </a:xfrm>
           <a:prstGeom prst="rect">
@@ -4380,56 +3946,6 @@
                 <a:cs typeface="Verdana" panose="020B0604030504040204" pitchFamily="34" charset="0"/>
               </a:rPr>
               <a:t>10.0.0.0/19</a:t>
-            </a:r>
-            <a:endParaRPr lang="en-US" sz="1000" dirty="0">
-              <a:latin typeface="Verdana" panose="020B0604030504040204" pitchFamily="34" charset="0"/>
-              <a:ea typeface="Verdana" panose="020B0604030504040204" pitchFamily="34" charset="0"/>
-              <a:cs typeface="Verdana" panose="020B0604030504040204" pitchFamily="34" charset="0"/>
-            </a:endParaRPr>
-          </a:p>
-        </p:txBody>
-      </p:sp>
-      <p:sp>
-        <p:nvSpPr>
-          <p:cNvPr id="131" name="TextBox 130"/>
-          <p:cNvSpPr txBox="1"/>
-          <p:nvPr/>
-        </p:nvSpPr>
-        <p:spPr>
-          <a:xfrm>
-            <a:off x="7568613" y="5488269"/>
-            <a:ext cx="1236668" cy="400110"/>
-          </a:xfrm>
-          <a:prstGeom prst="rect">
-            <a:avLst/>
-          </a:prstGeom>
-          <a:noFill/>
-        </p:spPr>
-        <p:txBody>
-          <a:bodyPr wrap="square" rtlCol="0">
-            <a:spAutoFit/>
-          </a:bodyPr>
-          <a:lstStyle/>
-          <a:p>
-            <a:pPr algn="ctr"/>
-            <a:r>
-              <a:rPr lang="en-US" sz="1000" dirty="0" smtClean="0">
-                <a:latin typeface="Verdana" panose="020B0604030504040204" pitchFamily="34" charset="0"/>
-                <a:ea typeface="Verdana" panose="020B0604030504040204" pitchFamily="34" charset="0"/>
-                <a:cs typeface="Verdana" panose="020B0604030504040204" pitchFamily="34" charset="0"/>
-              </a:rPr>
-              <a:t>Private subnet</a:t>
-            </a:r>
-          </a:p>
-          <a:p>
-            <a:pPr algn="ctr"/>
-            <a:r>
-              <a:rPr lang="en-US" sz="1000" dirty="0" smtClean="0">
-                <a:latin typeface="Verdana" panose="020B0604030504040204" pitchFamily="34" charset="0"/>
-                <a:ea typeface="Verdana" panose="020B0604030504040204" pitchFamily="34" charset="0"/>
-                <a:cs typeface="Verdana" panose="020B0604030504040204" pitchFamily="34" charset="0"/>
-              </a:rPr>
-              <a:t>10.0.32.0/19</a:t>
             </a:r>
             <a:endParaRPr lang="en-US" sz="1000" dirty="0">
               <a:latin typeface="Verdana" panose="020B0604030504040204" pitchFamily="34" charset="0"/>
@@ -4469,92 +3985,6 @@
           </a:fontRef>
         </p:style>
       </p:cxnSp>
-      <p:sp>
-        <p:nvSpPr>
-          <p:cNvPr id="157" name="Rectangle 156"/>
-          <p:cNvSpPr/>
-          <p:nvPr/>
-        </p:nvSpPr>
-        <p:spPr>
-          <a:xfrm>
-            <a:off x="7159147" y="1413159"/>
-            <a:ext cx="1815940" cy="218681"/>
-          </a:xfrm>
-          <a:prstGeom prst="rect">
-            <a:avLst/>
-          </a:prstGeom>
-          <a:solidFill>
-            <a:srgbClr val="FAA634"/>
-          </a:solidFill>
-          <a:ln w="6350">
-            <a:solidFill>
-              <a:schemeClr val="tx1"/>
-            </a:solidFill>
-          </a:ln>
-        </p:spPr>
-        <p:style>
-          <a:lnRef idx="2">
-            <a:schemeClr val="accent1">
-              <a:shade val="50000"/>
-            </a:schemeClr>
-          </a:lnRef>
-          <a:fillRef idx="1">
-            <a:schemeClr val="accent1"/>
-          </a:fillRef>
-          <a:effectRef idx="0">
-            <a:schemeClr val="accent1"/>
-          </a:effectRef>
-          <a:fontRef idx="minor">
-            <a:schemeClr val="lt1"/>
-          </a:fontRef>
-        </p:style>
-        <p:txBody>
-          <a:bodyPr rtlCol="0" anchor="ctr"/>
-          <a:lstStyle/>
-          <a:p>
-            <a:pPr algn="ctr"/>
-            <a:endParaRPr lang="en-US"/>
-          </a:p>
-        </p:txBody>
-      </p:sp>
-      <p:sp>
-        <p:nvSpPr>
-          <p:cNvPr id="158" name="TextBox 157"/>
-          <p:cNvSpPr txBox="1"/>
-          <p:nvPr/>
-        </p:nvSpPr>
-        <p:spPr>
-          <a:xfrm>
-            <a:off x="7113846" y="1399234"/>
-            <a:ext cx="1861241" cy="253916"/>
-          </a:xfrm>
-          <a:prstGeom prst="rect">
-            <a:avLst/>
-          </a:prstGeom>
-          <a:noFill/>
-        </p:spPr>
-        <p:txBody>
-          <a:bodyPr wrap="square" rtlCol="0">
-            <a:spAutoFit/>
-          </a:bodyPr>
-          <a:lstStyle/>
-          <a:p>
-            <a:r>
-              <a:rPr lang="en-US" sz="1050" dirty="0" smtClean="0">
-                <a:latin typeface="Verdana" panose="020B0604030504040204" pitchFamily="34" charset="0"/>
-                <a:ea typeface="Verdana" panose="020B0604030504040204" pitchFamily="34" charset="0"/>
-                <a:cs typeface="Verdana" panose="020B0604030504040204" pitchFamily="34" charset="0"/>
-              </a:rPr>
-              <a:t>Elastic IPs (public route)</a:t>
-            </a:r>
-            <a:endParaRPr lang="en-US" sz="1050" dirty="0">
-              <a:latin typeface="Verdana" panose="020B0604030504040204" pitchFamily="34" charset="0"/>
-              <a:ea typeface="Verdana" panose="020B0604030504040204" pitchFamily="34" charset="0"/>
-              <a:cs typeface="Verdana" panose="020B0604030504040204" pitchFamily="34" charset="0"/>
-            </a:endParaRPr>
-          </a:p>
-        </p:txBody>
-      </p:sp>
       <p:sp>
         <p:nvSpPr>
           <p:cNvPr id="175" name="Rectangle 174"/>
@@ -4611,7 +4041,7 @@
         </p:nvSpPr>
         <p:spPr>
           <a:xfrm>
-            <a:off x="3332877" y="1399032"/>
+            <a:off x="3363834" y="1399032"/>
             <a:ext cx="1877948" cy="253916"/>
           </a:xfrm>
           <a:prstGeom prst="rect">
@@ -4650,14 +4080,14 @@
           <p:nvPr/>
         </p:nvPicPr>
         <p:blipFill>
-          <a:blip r:embed="rId9"/>
+          <a:blip r:embed="rId8"/>
           <a:stretch>
             <a:fillRect/>
           </a:stretch>
         </p:blipFill>
         <p:spPr>
           <a:xfrm>
-            <a:off x="3349183" y="1939599"/>
+            <a:off x="3293586" y="1771375"/>
             <a:ext cx="639765" cy="670560"/>
           </a:xfrm>
           <a:prstGeom prst="rect">
@@ -4673,7 +4103,7 @@
         </p:nvSpPr>
         <p:spPr>
           <a:xfrm>
-            <a:off x="3327531" y="2668178"/>
+            <a:off x="3275279" y="2446928"/>
             <a:ext cx="640080" cy="274320"/>
           </a:xfrm>
           <a:prstGeom prst="rect">
@@ -4699,64 +4129,6 @@
           </a:p>
         </p:txBody>
       </p:sp>
-      <p:pic>
-        <p:nvPicPr>
-          <p:cNvPr id="60" name="Picture 59"/>
-          <p:cNvPicPr>
-            <a:picLocks noChangeAspect="1"/>
-          </p:cNvPicPr>
-          <p:nvPr/>
-        </p:nvPicPr>
-        <p:blipFill>
-          <a:blip r:embed="rId9"/>
-          <a:stretch>
-            <a:fillRect/>
-          </a:stretch>
-        </p:blipFill>
-        <p:spPr>
-          <a:xfrm>
-            <a:off x="8186913" y="1939599"/>
-            <a:ext cx="639765" cy="670560"/>
-          </a:xfrm>
-          <a:prstGeom prst="rect">
-            <a:avLst/>
-          </a:prstGeom>
-        </p:spPr>
-      </p:pic>
-      <p:sp>
-        <p:nvSpPr>
-          <p:cNvPr id="61" name="TextBox 60"/>
-          <p:cNvSpPr txBox="1"/>
-          <p:nvPr/>
-        </p:nvSpPr>
-        <p:spPr>
-          <a:xfrm>
-            <a:off x="8165261" y="2668178"/>
-            <a:ext cx="640080" cy="274320"/>
-          </a:xfrm>
-          <a:prstGeom prst="rect">
-            <a:avLst/>
-          </a:prstGeom>
-          <a:noFill/>
-        </p:spPr>
-        <p:txBody>
-          <a:bodyPr wrap="square" lIns="0" tIns="0" rIns="0" bIns="0" rtlCol="0" anchor="t">
-            <a:noAutofit/>
-          </a:bodyPr>
-          <a:lstStyle/>
-          <a:p>
-            <a:pPr algn="ctr"/>
-            <a:r>
-              <a:rPr lang="en-US" sz="1000" b="1" dirty="0">
-                <a:latin typeface="Verdana" panose="020B0604030504040204" pitchFamily="34" charset="0"/>
-                <a:ea typeface="Verdana" panose="020B0604030504040204" pitchFamily="34" charset="0"/>
-                <a:cs typeface="Verdana" panose="020B0604030504040204" pitchFamily="34" charset="0"/>
-              </a:rPr>
-              <a:t>NAT gateway</a:t>
-            </a:r>
-          </a:p>
-        </p:txBody>
-      </p:sp>
       <p:cxnSp>
         <p:nvCxnSpPr>
           <p:cNvPr id="92" name="Straight Connector 91"/>
@@ -4764,9 +4136,9 @@
           <p:nvPr/>
         </p:nvCxnSpPr>
         <p:spPr>
-          <a:xfrm>
-            <a:off x="5977363" y="1483384"/>
-            <a:ext cx="0" cy="1779769"/>
+          <a:xfrm flipH="1">
+            <a:off x="4927280" y="1194731"/>
+            <a:ext cx="1106102" cy="651539"/>
           </a:xfrm>
           <a:prstGeom prst="line">
             <a:avLst/>
@@ -4795,83 +4167,6 @@
           </a:fontRef>
         </p:style>
       </p:cxnSp>
-      <p:pic>
-        <p:nvPicPr>
-          <p:cNvPr id="89" name="Picture 88"/>
-          <p:cNvPicPr>
-            <a:picLocks noChangeAspect="1"/>
-          </p:cNvPicPr>
-          <p:nvPr/>
-        </p:nvPicPr>
-        <p:blipFill>
-          <a:blip r:embed="rId10">
-            <a:extLst>
-              <a:ext uri="{28A0092B-C50C-407E-A947-70E740481C1C}">
-                <a14:useLocalDpi xmlns:a14="http://schemas.microsoft.com/office/drawing/2010/main" val="0"/>
-              </a:ext>
-            </a:extLst>
-          </a:blip>
-          <a:stretch>
-            <a:fillRect/>
-          </a:stretch>
-        </p:blipFill>
-        <p:spPr>
-          <a:xfrm>
-            <a:off x="6927413" y="2020824"/>
-            <a:ext cx="544781" cy="575047"/>
-          </a:xfrm>
-          <a:prstGeom prst="rect">
-            <a:avLst/>
-          </a:prstGeom>
-        </p:spPr>
-      </p:pic>
-      <p:sp>
-        <p:nvSpPr>
-          <p:cNvPr id="90" name="TextBox 89"/>
-          <p:cNvSpPr txBox="1"/>
-          <p:nvPr/>
-        </p:nvSpPr>
-        <p:spPr>
-          <a:xfrm>
-            <a:off x="6986978" y="2606040"/>
-            <a:ext cx="640080" cy="274320"/>
-          </a:xfrm>
-          <a:prstGeom prst="rect">
-            <a:avLst/>
-          </a:prstGeom>
-          <a:noFill/>
-        </p:spPr>
-        <p:txBody>
-          <a:bodyPr wrap="square" lIns="0" tIns="0" rIns="0" bIns="0" rtlCol="0" anchor="t">
-            <a:noAutofit/>
-          </a:bodyPr>
-          <a:lstStyle/>
-          <a:p>
-            <a:pPr algn="ctr"/>
-            <a:r>
-              <a:rPr lang="en-US" sz="1000" b="1" dirty="0">
-                <a:latin typeface="Verdana" panose="020B0604030504040204" pitchFamily="34" charset="0"/>
-                <a:ea typeface="Verdana" panose="020B0604030504040204" pitchFamily="34" charset="0"/>
-                <a:cs typeface="Verdana" panose="020B0604030504040204" pitchFamily="34" charset="0"/>
-              </a:rPr>
-              <a:t>Bastion </a:t>
-            </a:r>
-            <a:r>
-              <a:rPr lang="en-US" sz="1000" b="1" dirty="0" smtClean="0">
-                <a:latin typeface="Verdana" panose="020B0604030504040204" pitchFamily="34" charset="0"/>
-                <a:ea typeface="Verdana" panose="020B0604030504040204" pitchFamily="34" charset="0"/>
-                <a:cs typeface="Verdana" panose="020B0604030504040204" pitchFamily="34" charset="0"/>
-              </a:rPr>
-              <a:t>hosts</a:t>
-            </a:r>
-            <a:endParaRPr lang="en-US" sz="1000" b="1" dirty="0">
-              <a:latin typeface="Verdana" panose="020B0604030504040204" pitchFamily="34" charset="0"/>
-              <a:ea typeface="Verdana" panose="020B0604030504040204" pitchFamily="34" charset="0"/>
-              <a:cs typeface="Verdana" panose="020B0604030504040204" pitchFamily="34" charset="0"/>
-            </a:endParaRPr>
-          </a:p>
-        </p:txBody>
-      </p:sp>
       <p:cxnSp>
         <p:nvCxnSpPr>
           <p:cNvPr id="95" name="Straight Connector 94"/>
@@ -4880,8 +4175,8 @@
         </p:nvCxnSpPr>
         <p:spPr>
           <a:xfrm>
-            <a:off x="6211399" y="1484526"/>
-            <a:ext cx="0" cy="1778627"/>
+            <a:off x="6295482" y="1206384"/>
+            <a:ext cx="0" cy="731192"/>
           </a:xfrm>
           <a:prstGeom prst="line">
             <a:avLst/>
@@ -4912,73 +4207,13 @@
       </p:cxnSp>
       <p:sp>
         <p:nvSpPr>
-          <p:cNvPr id="97" name="Rounded Rectangle 96"/>
-          <p:cNvSpPr/>
-          <p:nvPr/>
-        </p:nvSpPr>
-        <p:spPr>
-          <a:xfrm>
-            <a:off x="4318819" y="1958742"/>
-            <a:ext cx="3462572" cy="998819"/>
-          </a:xfrm>
-          <a:prstGeom prst="roundRect">
-            <a:avLst>
-              <a:gd name="adj" fmla="val 9818"/>
-            </a:avLst>
-          </a:prstGeom>
-          <a:solidFill>
-            <a:srgbClr val="D2D9CA">
-              <a:alpha val="50000"/>
-            </a:srgbClr>
-          </a:solidFill>
-          <a:ln w="19050">
-            <a:solidFill>
-              <a:schemeClr val="tx1"/>
-            </a:solidFill>
-            <a:prstDash val="dashDot"/>
-          </a:ln>
-          <a:effectLst/>
-        </p:spPr>
-        <p:style>
-          <a:lnRef idx="1">
-            <a:schemeClr val="accent1"/>
-          </a:lnRef>
-          <a:fillRef idx="3">
-            <a:schemeClr val="accent1"/>
-          </a:fillRef>
-          <a:effectRef idx="2">
-            <a:schemeClr val="accent1"/>
-          </a:effectRef>
-          <a:fontRef idx="minor">
-            <a:schemeClr val="lt1"/>
-          </a:fontRef>
-        </p:style>
-        <p:txBody>
-          <a:bodyPr anchor="ctr"/>
-          <a:lstStyle/>
-          <a:p>
-            <a:pPr algn="ctr">
-              <a:defRPr/>
-            </a:pPr>
-            <a:endParaRPr lang="en-US" sz="1400" dirty="0">
-              <a:solidFill>
-                <a:schemeClr val="tx1"/>
-              </a:solidFill>
-              <a:latin typeface="Helvetica Neue"/>
-              <a:cs typeface="Helvetica Neue"/>
-            </a:endParaRPr>
-          </a:p>
-        </p:txBody>
-      </p:sp>
-      <p:sp>
-        <p:nvSpPr>
           <p:cNvPr id="64" name="TextBox 63"/>
           <p:cNvSpPr txBox="1"/>
           <p:nvPr/>
         </p:nvSpPr>
         <p:spPr>
           <a:xfrm>
-            <a:off x="4621672" y="2604970"/>
+            <a:off x="4302808" y="2531646"/>
             <a:ext cx="640080" cy="274320"/>
           </a:xfrm>
           <a:prstGeom prst="rect">
@@ -5001,84 +4236,19 @@
               </a:rPr>
               <a:t>Bastion </a:t>
             </a:r>
-            <a:r>
-              <a:rPr lang="en-US" sz="1000" b="1" dirty="0" smtClean="0">
-                <a:latin typeface="Verdana" panose="020B0604030504040204" pitchFamily="34" charset="0"/>
-                <a:ea typeface="Verdana" panose="020B0604030504040204" pitchFamily="34" charset="0"/>
-                <a:cs typeface="Verdana" panose="020B0604030504040204" pitchFamily="34" charset="0"/>
-              </a:rPr>
-              <a:t>hosts</a:t>
-            </a:r>
-            <a:endParaRPr lang="en-US" sz="1000" b="1" dirty="0">
-              <a:latin typeface="Verdana" panose="020B0604030504040204" pitchFamily="34" charset="0"/>
-              <a:ea typeface="Verdana" panose="020B0604030504040204" pitchFamily="34" charset="0"/>
-              <a:cs typeface="Verdana" panose="020B0604030504040204" pitchFamily="34" charset="0"/>
-            </a:endParaRPr>
-          </a:p>
-        </p:txBody>
-      </p:sp>
-      <p:sp>
-        <p:nvSpPr>
-          <p:cNvPr id="67" name="TextBox 66"/>
-          <p:cNvSpPr txBox="1"/>
-          <p:nvPr/>
-        </p:nvSpPr>
-        <p:spPr>
-          <a:xfrm>
-            <a:off x="5365659" y="2673484"/>
-            <a:ext cx="1476970" cy="190712"/>
-          </a:xfrm>
-          <a:prstGeom prst="rect">
-            <a:avLst/>
-          </a:prstGeom>
-          <a:noFill/>
-        </p:spPr>
-        <p:txBody>
-          <a:bodyPr wrap="square" lIns="0" tIns="0" rIns="0" bIns="0" rtlCol="0" anchor="t">
-            <a:noAutofit/>
-          </a:bodyPr>
-          <a:lstStyle/>
-          <a:p>
-            <a:pPr algn="ctr"/>
-            <a:r>
-              <a:rPr lang="en-US" sz="1000" b="1" dirty="0" smtClean="0">
-                <a:solidFill>
-                  <a:schemeClr val="accent6">
-                    <a:lumMod val="50000"/>
-                  </a:schemeClr>
-                </a:solidFill>
-                <a:latin typeface="Verdana" panose="020B0604030504040204" pitchFamily="34" charset="0"/>
-                <a:ea typeface="Verdana" panose="020B0604030504040204" pitchFamily="34" charset="0"/>
-                <a:cs typeface="Verdana" panose="020B0604030504040204" pitchFamily="34" charset="0"/>
-              </a:rPr>
-              <a:t>Auto </a:t>
-            </a:r>
-            <a:r>
-              <a:rPr lang="en-US" sz="1000" b="1" dirty="0">
-                <a:solidFill>
-                  <a:schemeClr val="accent6">
-                    <a:lumMod val="50000"/>
-                  </a:schemeClr>
-                </a:solidFill>
-                <a:latin typeface="Verdana" panose="020B0604030504040204" pitchFamily="34" charset="0"/>
-                <a:ea typeface="Verdana" panose="020B0604030504040204" pitchFamily="34" charset="0"/>
-                <a:cs typeface="Verdana" panose="020B0604030504040204" pitchFamily="34" charset="0"/>
-              </a:rPr>
-              <a:t>Scaling group</a:t>
-            </a:r>
           </a:p>
         </p:txBody>
       </p:sp>
       <p:pic>
         <p:nvPicPr>
-          <p:cNvPr id="87" name="Picture 86"/>
+          <p:cNvPr id="91" name="Picture 90"/>
           <p:cNvPicPr>
             <a:picLocks noChangeAspect="1"/>
           </p:cNvPicPr>
           <p:nvPr/>
         </p:nvPicPr>
         <p:blipFill>
-          <a:blip r:embed="rId11">
+          <a:blip r:embed="rId9">
             <a:extLst>
               <a:ext uri="{28A0092B-C50C-407E-A947-70E740481C1C}">
                 <a14:useLocalDpi xmlns:a14="http://schemas.microsoft.com/office/drawing/2010/main" val="0"/>
@@ -5091,67 +4261,7 @@
         </p:blipFill>
         <p:spPr>
           <a:xfrm>
-            <a:off x="5831753" y="2142068"/>
-            <a:ext cx="544781" cy="529649"/>
-          </a:xfrm>
-          <a:prstGeom prst="rect">
-            <a:avLst/>
-          </a:prstGeom>
-        </p:spPr>
-      </p:pic>
-      <p:pic>
-        <p:nvPicPr>
-          <p:cNvPr id="88" name="Picture 87"/>
-          <p:cNvPicPr>
-            <a:picLocks noChangeAspect="1"/>
-          </p:cNvPicPr>
-          <p:nvPr/>
-        </p:nvPicPr>
-        <p:blipFill>
-          <a:blip r:embed="rId10">
-            <a:extLst>
-              <a:ext uri="{28A0092B-C50C-407E-A947-70E740481C1C}">
-                <a14:useLocalDpi xmlns:a14="http://schemas.microsoft.com/office/drawing/2010/main" val="0"/>
-              </a:ext>
-            </a:extLst>
-          </a:blip>
-          <a:stretch>
-            <a:fillRect/>
-          </a:stretch>
-        </p:blipFill>
-        <p:spPr>
-          <a:xfrm>
-            <a:off x="4586629" y="2020295"/>
-            <a:ext cx="544781" cy="575047"/>
-          </a:xfrm>
-          <a:prstGeom prst="rect">
-            <a:avLst/>
-          </a:prstGeom>
-        </p:spPr>
-      </p:pic>
-      <p:pic>
-        <p:nvPicPr>
-          <p:cNvPr id="91" name="Picture 90"/>
-          <p:cNvPicPr>
-            <a:picLocks noChangeAspect="1"/>
-          </p:cNvPicPr>
-          <p:nvPr/>
-        </p:nvPicPr>
-        <p:blipFill>
-          <a:blip r:embed="rId12">
-            <a:extLst>
-              <a:ext uri="{28A0092B-C50C-407E-A947-70E740481C1C}">
-                <a14:useLocalDpi xmlns:a14="http://schemas.microsoft.com/office/drawing/2010/main" val="0"/>
-              </a:ext>
-            </a:extLst>
-          </a:blip>
-          <a:stretch>
-            <a:fillRect/>
-          </a:stretch>
-        </p:blipFill>
-        <p:spPr>
-          <a:xfrm>
-            <a:off x="5845953" y="3263153"/>
+            <a:off x="5894085" y="1897794"/>
             <a:ext cx="543639" cy="564958"/>
           </a:xfrm>
           <a:prstGeom prst="rect">
@@ -5161,14 +4271,14 @@
       </p:pic>
       <p:cxnSp>
         <p:nvCxnSpPr>
-          <p:cNvPr id="93" name="Elbow Connector 138"/>
+          <p:cNvPr id="94" name="Elbow Connector 142"/>
           <p:cNvCxnSpPr/>
           <p:nvPr/>
         </p:nvCxnSpPr>
         <p:spPr>
-          <a:xfrm>
-            <a:off x="6401808" y="3482424"/>
-            <a:ext cx="1102397" cy="304207"/>
+          <a:xfrm flipH="1">
+            <a:off x="3799619" y="2365338"/>
+            <a:ext cx="2205255" cy="1332700"/>
           </a:xfrm>
           <a:prstGeom prst="straightConnector1">
             <a:avLst/>
@@ -5199,46 +4309,6 @@
           </a:fontRef>
         </p:style>
       </p:cxnSp>
-      <p:cxnSp>
-        <p:nvCxnSpPr>
-          <p:cNvPr id="94" name="Elbow Connector 142"/>
-          <p:cNvCxnSpPr/>
-          <p:nvPr/>
-        </p:nvCxnSpPr>
-        <p:spPr>
-          <a:xfrm flipH="1">
-            <a:off x="4647787" y="3482423"/>
-            <a:ext cx="1161288" cy="301752"/>
-          </a:xfrm>
-          <a:prstGeom prst="straightConnector1">
-            <a:avLst/>
-          </a:prstGeom>
-          <a:ln w="19050">
-            <a:tailEnd type="triangle"/>
-          </a:ln>
-          <a:effectLst>
-            <a:outerShdw blurRad="50800" dist="38100" dir="2700000" algn="ctr" rotWithShape="0">
-              <a:schemeClr val="bg2">
-                <a:lumMod val="50000"/>
-              </a:schemeClr>
-            </a:outerShdw>
-          </a:effectLst>
-        </p:spPr>
-        <p:style>
-          <a:lnRef idx="1">
-            <a:schemeClr val="accent1"/>
-          </a:lnRef>
-          <a:fillRef idx="0">
-            <a:schemeClr val="accent1"/>
-          </a:fillRef>
-          <a:effectRef idx="0">
-            <a:schemeClr val="accent1"/>
-          </a:effectRef>
-          <a:fontRef idx="minor">
-            <a:schemeClr val="tx1"/>
-          </a:fontRef>
-        </p:style>
-      </p:cxnSp>
       <p:sp>
         <p:nvSpPr>
           <p:cNvPr id="96" name="TextBox 95"/>
@@ -5247,7 +4317,7 @@
         </p:nvSpPr>
         <p:spPr>
           <a:xfrm>
-            <a:off x="5712137" y="3859245"/>
+            <a:off x="6573197" y="2011119"/>
             <a:ext cx="865690" cy="400110"/>
           </a:xfrm>
           <a:prstGeom prst="rect">
@@ -5277,127 +4347,340 @@
           </a:p>
         </p:txBody>
       </p:sp>
-      <p:sp>
-        <p:nvSpPr>
-          <p:cNvPr id="98" name="TextBox 97"/>
-          <p:cNvSpPr txBox="1"/>
+      <p:grpSp>
+        <p:nvGrpSpPr>
+          <p:cNvPr id="7" name="Group 6"/>
+          <p:cNvGrpSpPr/>
           <p:nvPr/>
-        </p:nvSpPr>
+        </p:nvGrpSpPr>
+        <p:grpSpPr>
+          <a:xfrm>
+            <a:off x="4436581" y="3460435"/>
+            <a:ext cx="1044070" cy="920869"/>
+            <a:chOff x="4260056" y="4040678"/>
+            <a:chExt cx="1044070" cy="920869"/>
+          </a:xfrm>
+        </p:grpSpPr>
+        <p:pic>
+          <p:nvPicPr>
+            <p:cNvPr id="118" name="Picture 117"/>
+            <p:cNvPicPr>
+              <a:picLocks noChangeAspect="1"/>
+            </p:cNvPicPr>
+            <p:nvPr/>
+          </p:nvPicPr>
+          <p:blipFill>
+            <a:blip r:embed="rId7">
+              <a:extLst>
+                <a:ext uri="{28A0092B-C50C-407E-A947-70E740481C1C}">
+                  <a14:useLocalDpi xmlns:a14="http://schemas.microsoft.com/office/drawing/2010/main" val="0"/>
+                </a:ext>
+              </a:extLst>
+            </a:blip>
+            <a:stretch>
+              <a:fillRect/>
+            </a:stretch>
+          </p:blipFill>
+          <p:spPr>
+            <a:xfrm>
+              <a:off x="4487295" y="4040678"/>
+              <a:ext cx="544782" cy="564959"/>
+            </a:xfrm>
+            <a:prstGeom prst="rect">
+              <a:avLst/>
+            </a:prstGeom>
+          </p:spPr>
+        </p:pic>
+        <p:sp>
+          <p:nvSpPr>
+            <p:cNvPr id="98" name="TextBox 97"/>
+            <p:cNvSpPr txBox="1"/>
+            <p:nvPr/>
+          </p:nvSpPr>
+          <p:spPr>
+            <a:xfrm>
+              <a:off x="4260056" y="4687227"/>
+              <a:ext cx="1044070" cy="274320"/>
+            </a:xfrm>
+            <a:prstGeom prst="rect">
+              <a:avLst/>
+            </a:prstGeom>
+            <a:noFill/>
+          </p:spPr>
+          <p:txBody>
+            <a:bodyPr wrap="square" lIns="0" tIns="0" rIns="0" bIns="0" rtlCol="0" anchor="t">
+              <a:noAutofit/>
+            </a:bodyPr>
+            <a:lstStyle/>
+            <a:p>
+              <a:pPr algn="ctr"/>
+              <a:r>
+                <a:rPr lang="en-US" sz="1000" b="1" dirty="0" smtClean="0">
+                  <a:latin typeface="Verdana" panose="020B0604030504040204" pitchFamily="34" charset="0"/>
+                  <a:ea typeface="Verdana" panose="020B0604030504040204" pitchFamily="34" charset="0"/>
+                  <a:cs typeface="Verdana" panose="020B0604030504040204" pitchFamily="34" charset="0"/>
+                </a:rPr>
+                <a:t>CAS Controller</a:t>
+              </a:r>
+              <a:endParaRPr lang="en-US" sz="1000" b="1" dirty="0">
+                <a:latin typeface="Verdana" panose="020B0604030504040204" pitchFamily="34" charset="0"/>
+                <a:ea typeface="Verdana" panose="020B0604030504040204" pitchFamily="34" charset="0"/>
+                <a:cs typeface="Verdana" panose="020B0604030504040204" pitchFamily="34" charset="0"/>
+              </a:endParaRPr>
+            </a:p>
+          </p:txBody>
+        </p:sp>
+      </p:grpSp>
+      <p:pic>
+        <p:nvPicPr>
+          <p:cNvPr id="65" name="Picture 64"/>
+          <p:cNvPicPr>
+            <a:picLocks noChangeAspect="1"/>
+          </p:cNvPicPr>
+          <p:nvPr/>
+        </p:nvPicPr>
+        <p:blipFill>
+          <a:blip r:embed="rId7">
+            <a:extLst>
+              <a:ext uri="{28A0092B-C50C-407E-A947-70E740481C1C}">
+                <a14:useLocalDpi xmlns:a14="http://schemas.microsoft.com/office/drawing/2010/main" val="0"/>
+              </a:ext>
+            </a:extLst>
+          </a:blip>
+          <a:stretch>
+            <a:fillRect/>
+          </a:stretch>
+        </p:blipFill>
         <p:spPr>
           <a:xfrm>
-            <a:off x="4260056" y="4687227"/>
-            <a:ext cx="1044070" cy="274320"/>
+            <a:off x="4363671" y="1846270"/>
+            <a:ext cx="544782" cy="564959"/>
           </a:xfrm>
           <a:prstGeom prst="rect">
             <a:avLst/>
           </a:prstGeom>
-          <a:noFill/>
         </p:spPr>
-        <p:txBody>
-          <a:bodyPr wrap="square" lIns="0" tIns="0" rIns="0" bIns="0" rtlCol="0" anchor="t">
-            <a:noAutofit/>
-          </a:bodyPr>
-          <a:lstStyle/>
-          <a:p>
-            <a:pPr algn="ctr"/>
-            <a:r>
-              <a:rPr lang="en-US" sz="1000" dirty="0" smtClean="0">
+      </p:pic>
+      <p:grpSp>
+        <p:nvGrpSpPr>
+          <p:cNvPr id="8" name="Group 7"/>
+          <p:cNvGrpSpPr/>
+          <p:nvPr/>
+        </p:nvGrpSpPr>
+        <p:grpSpPr>
+          <a:xfrm>
+            <a:off x="3023287" y="4533038"/>
+            <a:ext cx="2317771" cy="930915"/>
+            <a:chOff x="3171007" y="4438261"/>
+            <a:chExt cx="2317771" cy="930915"/>
+          </a:xfrm>
+        </p:grpSpPr>
+        <p:sp>
+          <p:nvSpPr>
+            <p:cNvPr id="66" name="Rounded Rectangle 65"/>
+            <p:cNvSpPr/>
+            <p:nvPr/>
+          </p:nvSpPr>
+          <p:spPr>
+            <a:xfrm>
+              <a:off x="3171007" y="4438261"/>
+              <a:ext cx="2317771" cy="930915"/>
+            </a:xfrm>
+            <a:prstGeom prst="roundRect">
+              <a:avLst>
+                <a:gd name="adj" fmla="val 9818"/>
+              </a:avLst>
+            </a:prstGeom>
+            <a:solidFill>
+              <a:srgbClr val="D2D9CA">
+                <a:alpha val="50000"/>
+              </a:srgbClr>
+            </a:solidFill>
+            <a:ln w="19050">
+              <a:solidFill>
+                <a:schemeClr val="tx1"/>
+              </a:solidFill>
+              <a:prstDash val="dashDot"/>
+            </a:ln>
+            <a:effectLst/>
+          </p:spPr>
+          <p:style>
+            <a:lnRef idx="1">
+              <a:schemeClr val="accent1"/>
+            </a:lnRef>
+            <a:fillRef idx="3">
+              <a:schemeClr val="accent1"/>
+            </a:fillRef>
+            <a:effectRef idx="2">
+              <a:schemeClr val="accent1"/>
+            </a:effectRef>
+            <a:fontRef idx="minor">
+              <a:schemeClr val="lt1"/>
+            </a:fontRef>
+          </p:style>
+          <p:txBody>
+            <a:bodyPr anchor="ctr"/>
+            <a:lstStyle/>
+            <a:p>
+              <a:pPr algn="ctr">
+                <a:defRPr/>
+              </a:pPr>
+              <a:endParaRPr lang="en-US" sz="1400" dirty="0">
+                <a:solidFill>
+                  <a:schemeClr val="tx1"/>
+                </a:solidFill>
+                <a:latin typeface="Helvetica Neue"/>
+                <a:cs typeface="Helvetica Neue"/>
+              </a:endParaRPr>
+            </a:p>
+          </p:txBody>
+        </p:sp>
+        <p:sp>
+          <p:nvSpPr>
+            <p:cNvPr id="77" name="TextBox 76"/>
+            <p:cNvSpPr txBox="1"/>
+            <p:nvPr/>
+          </p:nvSpPr>
+          <p:spPr>
+            <a:xfrm>
+              <a:off x="4728973" y="5052939"/>
+              <a:ext cx="615780" cy="255670"/>
+            </a:xfrm>
+            <a:prstGeom prst="rect">
+              <a:avLst/>
+            </a:prstGeom>
+            <a:noFill/>
+          </p:spPr>
+          <p:txBody>
+            <a:bodyPr wrap="square" lIns="0" tIns="0" rIns="0" bIns="0" rtlCol="0" anchor="t">
+              <a:noAutofit/>
+            </a:bodyPr>
+            <a:lstStyle/>
+            <a:p>
+              <a:pPr algn="ctr"/>
+              <a:r>
+                <a:rPr lang="en-US" sz="1000" b="1" dirty="0" smtClean="0">
+                  <a:latin typeface="Verdana" panose="020B0604030504040204" pitchFamily="34" charset="0"/>
+                  <a:ea typeface="Verdana" panose="020B0604030504040204" pitchFamily="34" charset="0"/>
+                  <a:cs typeface="Verdana" panose="020B0604030504040204" pitchFamily="34" charset="0"/>
+                </a:rPr>
+                <a:t>CAS Workers</a:t>
+              </a:r>
+              <a:endParaRPr lang="en-US" sz="1000" b="1" dirty="0">
                 <a:latin typeface="Verdana" panose="020B0604030504040204" pitchFamily="34" charset="0"/>
                 <a:ea typeface="Verdana" panose="020B0604030504040204" pitchFamily="34" charset="0"/>
                 <a:cs typeface="Verdana" panose="020B0604030504040204" pitchFamily="34" charset="0"/>
-              </a:rPr>
-              <a:t>&lt;your product instances&gt;</a:t>
-            </a:r>
-            <a:endParaRPr lang="en-US" sz="1000" dirty="0">
-              <a:latin typeface="Verdana" panose="020B0604030504040204" pitchFamily="34" charset="0"/>
-              <a:ea typeface="Verdana" panose="020B0604030504040204" pitchFamily="34" charset="0"/>
-              <a:cs typeface="Verdana" panose="020B0604030504040204" pitchFamily="34" charset="0"/>
-            </a:endParaRPr>
-          </a:p>
-        </p:txBody>
-      </p:sp>
-      <p:sp>
-        <p:nvSpPr>
-          <p:cNvPr id="99" name="TextBox 98"/>
-          <p:cNvSpPr txBox="1"/>
-          <p:nvPr/>
-        </p:nvSpPr>
-        <p:spPr>
-          <a:xfrm>
-            <a:off x="7049620" y="4687227"/>
-            <a:ext cx="1044070" cy="274320"/>
-          </a:xfrm>
-          <a:prstGeom prst="rect">
-            <a:avLst/>
-          </a:prstGeom>
-          <a:noFill/>
-        </p:spPr>
-        <p:txBody>
-          <a:bodyPr wrap="square" lIns="0" tIns="0" rIns="0" bIns="0" rtlCol="0" anchor="t">
-            <a:noAutofit/>
-          </a:bodyPr>
-          <a:lstStyle/>
-          <a:p>
-            <a:pPr algn="ctr"/>
-            <a:r>
-              <a:rPr lang="en-US" sz="1000" dirty="0" smtClean="0">
-                <a:latin typeface="Verdana" panose="020B0604030504040204" pitchFamily="34" charset="0"/>
-                <a:ea typeface="Verdana" panose="020B0604030504040204" pitchFamily="34" charset="0"/>
-                <a:cs typeface="Verdana" panose="020B0604030504040204" pitchFamily="34" charset="0"/>
-              </a:rPr>
-              <a:t>&lt;your product instances&gt;</a:t>
-            </a:r>
-            <a:endParaRPr lang="en-US" sz="1000" dirty="0">
-              <a:latin typeface="Verdana" panose="020B0604030504040204" pitchFamily="34" charset="0"/>
-              <a:ea typeface="Verdana" panose="020B0604030504040204" pitchFamily="34" charset="0"/>
-              <a:cs typeface="Verdana" panose="020B0604030504040204" pitchFamily="34" charset="0"/>
-            </a:endParaRPr>
-          </a:p>
-        </p:txBody>
-      </p:sp>
-      <p:sp>
-        <p:nvSpPr>
-          <p:cNvPr id="100" name="TextBox 99"/>
-          <p:cNvSpPr txBox="1"/>
-          <p:nvPr/>
-        </p:nvSpPr>
-        <p:spPr>
-          <a:xfrm>
-            <a:off x="8181697" y="4687227"/>
-            <a:ext cx="1044070" cy="274320"/>
-          </a:xfrm>
-          <a:prstGeom prst="rect">
-            <a:avLst/>
-          </a:prstGeom>
-          <a:noFill/>
-        </p:spPr>
-        <p:txBody>
-          <a:bodyPr wrap="square" lIns="0" tIns="0" rIns="0" bIns="0" rtlCol="0" anchor="t">
-            <a:noAutofit/>
-          </a:bodyPr>
-          <a:lstStyle/>
-          <a:p>
-            <a:pPr algn="ctr"/>
-            <a:r>
-              <a:rPr lang="en-US" sz="1000" dirty="0" smtClean="0">
-                <a:latin typeface="Verdana" panose="020B0604030504040204" pitchFamily="34" charset="0"/>
-                <a:ea typeface="Verdana" panose="020B0604030504040204" pitchFamily="34" charset="0"/>
-                <a:cs typeface="Verdana" panose="020B0604030504040204" pitchFamily="34" charset="0"/>
-              </a:rPr>
-              <a:t>&lt;your product instances&gt;</a:t>
-            </a:r>
-            <a:endParaRPr lang="en-US" sz="1000" dirty="0">
-              <a:latin typeface="Verdana" panose="020B0604030504040204" pitchFamily="34" charset="0"/>
-              <a:ea typeface="Verdana" panose="020B0604030504040204" pitchFamily="34" charset="0"/>
-              <a:cs typeface="Verdana" panose="020B0604030504040204" pitchFamily="34" charset="0"/>
-            </a:endParaRPr>
-          </a:p>
-        </p:txBody>
-      </p:sp>
+              </a:endParaRPr>
+            </a:p>
+          </p:txBody>
+        </p:sp>
+        <p:sp>
+          <p:nvSpPr>
+            <p:cNvPr id="78" name="TextBox 77"/>
+            <p:cNvSpPr txBox="1"/>
+            <p:nvPr/>
+          </p:nvSpPr>
+          <p:spPr>
+            <a:xfrm>
+              <a:off x="3250701" y="5135557"/>
+              <a:ext cx="1420898" cy="177747"/>
+            </a:xfrm>
+            <a:prstGeom prst="rect">
+              <a:avLst/>
+            </a:prstGeom>
+            <a:noFill/>
+          </p:spPr>
+          <p:txBody>
+            <a:bodyPr wrap="square" lIns="0" tIns="0" rIns="0" bIns="0" rtlCol="0" anchor="t">
+              <a:noAutofit/>
+            </a:bodyPr>
+            <a:lstStyle/>
+            <a:p>
+              <a:pPr algn="ctr"/>
+              <a:r>
+                <a:rPr lang="en-US" sz="1000" b="1" dirty="0" smtClean="0">
+                  <a:latin typeface="Verdana" panose="020B0604030504040204" pitchFamily="34" charset="0"/>
+                  <a:ea typeface="Verdana" panose="020B0604030504040204" pitchFamily="34" charset="0"/>
+                  <a:cs typeface="Verdana" panose="020B0604030504040204" pitchFamily="34" charset="0"/>
+                </a:rPr>
+                <a:t>Auto </a:t>
+              </a:r>
+              <a:r>
+                <a:rPr lang="en-US" sz="1000" b="1" dirty="0">
+                  <a:latin typeface="Verdana" panose="020B0604030504040204" pitchFamily="34" charset="0"/>
+                  <a:ea typeface="Verdana" panose="020B0604030504040204" pitchFamily="34" charset="0"/>
+                  <a:cs typeface="Verdana" panose="020B0604030504040204" pitchFamily="34" charset="0"/>
+                </a:rPr>
+                <a:t>Scaling group</a:t>
+              </a:r>
+            </a:p>
+          </p:txBody>
+        </p:sp>
+        <p:pic>
+          <p:nvPicPr>
+            <p:cNvPr id="79" name="Picture 78"/>
+            <p:cNvPicPr>
+              <a:picLocks noChangeAspect="1"/>
+            </p:cNvPicPr>
+            <p:nvPr/>
+          </p:nvPicPr>
+          <p:blipFill>
+            <a:blip r:embed="rId10">
+              <a:extLst>
+                <a:ext uri="{28A0092B-C50C-407E-A947-70E740481C1C}">
+                  <a14:useLocalDpi xmlns:a14="http://schemas.microsoft.com/office/drawing/2010/main" val="0"/>
+                </a:ext>
+              </a:extLst>
+            </a:blip>
+            <a:stretch>
+              <a:fillRect/>
+            </a:stretch>
+          </p:blipFill>
+          <p:spPr>
+            <a:xfrm>
+              <a:off x="3619406" y="4489088"/>
+              <a:ext cx="524099" cy="493642"/>
+            </a:xfrm>
+            <a:prstGeom prst="rect">
+              <a:avLst/>
+            </a:prstGeom>
+          </p:spPr>
+        </p:pic>
+        <p:pic>
+          <p:nvPicPr>
+            <p:cNvPr id="80" name="Picture 79"/>
+            <p:cNvPicPr>
+              <a:picLocks noChangeAspect="1"/>
+            </p:cNvPicPr>
+            <p:nvPr/>
+          </p:nvPicPr>
+          <p:blipFill>
+            <a:blip r:embed="rId11">
+              <a:extLst>
+                <a:ext uri="{28A0092B-C50C-407E-A947-70E740481C1C}">
+                  <a14:useLocalDpi xmlns:a14="http://schemas.microsoft.com/office/drawing/2010/main" val="0"/>
+                </a:ext>
+              </a:extLst>
+            </a:blip>
+            <a:stretch>
+              <a:fillRect/>
+            </a:stretch>
+          </p:blipFill>
+          <p:spPr>
+            <a:xfrm>
+              <a:off x="4825933" y="4489090"/>
+              <a:ext cx="421861" cy="431402"/>
+            </a:xfrm>
+            <a:prstGeom prst="rect">
+              <a:avLst/>
+            </a:prstGeom>
+          </p:spPr>
+        </p:pic>
+      </p:grpSp>
     </p:spTree>
     <p:extLst>
       <p:ext uri="{BB962C8B-B14F-4D97-AF65-F5344CB8AC3E}">
-        <p14:creationId xmlns:p14="http://schemas.microsoft.com/office/powerpoint/2010/main" val="1446150147"/>
+        <p14:creationId xmlns:p14="http://schemas.microsoft.com/office/powerpoint/2010/main" val="212558939"/>
       </p:ext>
     </p:extLst>
   </p:cSld>

</xml_diff>

<commit_message>
add raiding of ephemeral drives
</commit_message>
<xml_diff>
--- a/doc/Quick Start architecture diagram.pptx
+++ b/doc/Quick Start architecture diagram.pptx
@@ -3565,54 +3565,6 @@
           </a:prstGeom>
         </p:spPr>
       </p:pic>
-      <p:pic>
-        <p:nvPicPr>
-          <p:cNvPr id="68" name="Picture 67"/>
-          <p:cNvPicPr>
-            <a:picLocks noChangeAspect="1"/>
-          </p:cNvPicPr>
-          <p:nvPr/>
-        </p:nvPicPr>
-        <p:blipFill>
-          <a:blip r:embed="rId5"/>
-          <a:stretch>
-            <a:fillRect/>
-          </a:stretch>
-        </p:blipFill>
-        <p:spPr>
-          <a:xfrm>
-            <a:off x="2937953" y="3620494"/>
-            <a:ext cx="215900" cy="241300"/>
-          </a:xfrm>
-          <a:prstGeom prst="rect">
-            <a:avLst/>
-          </a:prstGeom>
-        </p:spPr>
-      </p:pic>
-      <p:pic>
-        <p:nvPicPr>
-          <p:cNvPr id="70" name="Picture 69"/>
-          <p:cNvPicPr>
-            <a:picLocks noChangeAspect="1"/>
-          </p:cNvPicPr>
-          <p:nvPr/>
-        </p:nvPicPr>
-        <p:blipFill>
-          <a:blip r:embed="rId5"/>
-          <a:stretch>
-            <a:fillRect/>
-          </a:stretch>
-        </p:blipFill>
-        <p:spPr>
-          <a:xfrm>
-            <a:off x="2937953" y="1343207"/>
-            <a:ext cx="215900" cy="241300"/>
-          </a:xfrm>
-          <a:prstGeom prst="rect">
-            <a:avLst/>
-          </a:prstGeom>
-        </p:spPr>
-      </p:pic>
       <p:sp>
         <p:nvSpPr>
           <p:cNvPr id="72" name="TextBox 33"/>
@@ -3673,7 +3625,7 @@
           <p:nvPr/>
         </p:nvPicPr>
         <p:blipFill>
-          <a:blip r:embed="rId6">
+          <a:blip r:embed="rId5">
             <a:extLst>
               <a:ext uri="{28A0092B-C50C-407E-A947-70E740481C1C}">
                 <a14:useLocalDpi xmlns:a14="http://schemas.microsoft.com/office/drawing/2010/main" val="0"/>
@@ -3833,7 +3785,7 @@
             <p:nvPr/>
           </p:nvPicPr>
           <p:blipFill>
-            <a:blip r:embed="rId7">
+            <a:blip r:embed="rId6">
               <a:extLst>
                 <a:ext uri="{28A0092B-C50C-407E-A947-70E740481C1C}">
                   <a14:useLocalDpi xmlns:a14="http://schemas.microsoft.com/office/drawing/2010/main" val="0"/>
@@ -4080,7 +4032,7 @@
           <p:nvPr/>
         </p:nvPicPr>
         <p:blipFill>
-          <a:blip r:embed="rId8"/>
+          <a:blip r:embed="rId7"/>
           <a:stretch>
             <a:fillRect/>
           </a:stretch>
@@ -4248,7 +4200,7 @@
           <p:nvPr/>
         </p:nvPicPr>
         <p:blipFill>
-          <a:blip r:embed="rId9">
+          <a:blip r:embed="rId8">
             <a:extLst>
               <a:ext uri="{28A0092B-C50C-407E-A947-70E740481C1C}">
                 <a14:useLocalDpi xmlns:a14="http://schemas.microsoft.com/office/drawing/2010/main" val="0"/>
@@ -4370,7 +4322,7 @@
             <p:nvPr/>
           </p:nvPicPr>
           <p:blipFill>
-            <a:blip r:embed="rId7">
+            <a:blip r:embed="rId6">
               <a:extLst>
                 <a:ext uri="{28A0092B-C50C-407E-A947-70E740481C1C}">
                   <a14:useLocalDpi xmlns:a14="http://schemas.microsoft.com/office/drawing/2010/main" val="0"/>
@@ -4440,7 +4392,7 @@
           <p:nvPr/>
         </p:nvPicPr>
         <p:blipFill>
-          <a:blip r:embed="rId7">
+          <a:blip r:embed="rId6">
             <a:extLst>
               <a:ext uri="{28A0092B-C50C-407E-A947-70E740481C1C}">
                 <a14:useLocalDpi xmlns:a14="http://schemas.microsoft.com/office/drawing/2010/main" val="0"/>
@@ -4625,7 +4577,7 @@
             <p:nvPr/>
           </p:nvPicPr>
           <p:blipFill>
-            <a:blip r:embed="rId10">
+            <a:blip r:embed="rId9">
               <a:extLst>
                 <a:ext uri="{28A0092B-C50C-407E-A947-70E740481C1C}">
                   <a14:useLocalDpi xmlns:a14="http://schemas.microsoft.com/office/drawing/2010/main" val="0"/>
@@ -4655,7 +4607,7 @@
             <p:nvPr/>
           </p:nvPicPr>
           <p:blipFill>
-            <a:blip r:embed="rId11">
+            <a:blip r:embed="rId10">
               <a:extLst>
                 <a:ext uri="{28A0092B-C50C-407E-A947-70E740481C1C}">
                   <a14:useLocalDpi xmlns:a14="http://schemas.microsoft.com/office/drawing/2010/main" val="0"/>

</xml_diff>

<commit_message>
add CloudWatch icon to arch diagram
</commit_message>
<xml_diff>
--- a/doc/Quick Start architecture diagram.pptx
+++ b/doc/Quick Start architecture diagram.pptx
@@ -243,7 +243,7 @@
           <a:p>
             <a:fld id="{5075756A-E1AA-F843-BF52-05C1433C8A91}" type="datetimeFigureOut">
               <a:rPr lang="en-US" smtClean="0"/>
-              <a:t>8/11/2017</a:t>
+              <a:t>9/7/2017</a:t>
             </a:fld>
             <a:endParaRPr lang="en-US"/>
           </a:p>
@@ -413,7 +413,7 @@
           <a:p>
             <a:fld id="{5075756A-E1AA-F843-BF52-05C1433C8A91}" type="datetimeFigureOut">
               <a:rPr lang="en-US" smtClean="0"/>
-              <a:t>8/11/2017</a:t>
+              <a:t>9/7/2017</a:t>
             </a:fld>
             <a:endParaRPr lang="en-US"/>
           </a:p>
@@ -593,7 +593,7 @@
           <a:p>
             <a:fld id="{5075756A-E1AA-F843-BF52-05C1433C8A91}" type="datetimeFigureOut">
               <a:rPr lang="en-US" smtClean="0"/>
-              <a:t>8/11/2017</a:t>
+              <a:t>9/7/2017</a:t>
             </a:fld>
             <a:endParaRPr lang="en-US"/>
           </a:p>
@@ -763,7 +763,7 @@
           <a:p>
             <a:fld id="{5075756A-E1AA-F843-BF52-05C1433C8A91}" type="datetimeFigureOut">
               <a:rPr lang="en-US" smtClean="0"/>
-              <a:t>8/11/2017</a:t>
+              <a:t>9/7/2017</a:t>
             </a:fld>
             <a:endParaRPr lang="en-US"/>
           </a:p>
@@ -1009,7 +1009,7 @@
           <a:p>
             <a:fld id="{5075756A-E1AA-F843-BF52-05C1433C8A91}" type="datetimeFigureOut">
               <a:rPr lang="en-US" smtClean="0"/>
-              <a:t>8/11/2017</a:t>
+              <a:t>9/7/2017</a:t>
             </a:fld>
             <a:endParaRPr lang="en-US"/>
           </a:p>
@@ -1241,7 +1241,7 @@
           <a:p>
             <a:fld id="{5075756A-E1AA-F843-BF52-05C1433C8A91}" type="datetimeFigureOut">
               <a:rPr lang="en-US" smtClean="0"/>
-              <a:t>8/11/2017</a:t>
+              <a:t>9/7/2017</a:t>
             </a:fld>
             <a:endParaRPr lang="en-US"/>
           </a:p>
@@ -1608,7 +1608,7 @@
           <a:p>
             <a:fld id="{5075756A-E1AA-F843-BF52-05C1433C8A91}" type="datetimeFigureOut">
               <a:rPr lang="en-US" smtClean="0"/>
-              <a:t>8/11/2017</a:t>
+              <a:t>9/7/2017</a:t>
             </a:fld>
             <a:endParaRPr lang="en-US"/>
           </a:p>
@@ -1726,7 +1726,7 @@
           <a:p>
             <a:fld id="{5075756A-E1AA-F843-BF52-05C1433C8A91}" type="datetimeFigureOut">
               <a:rPr lang="en-US" smtClean="0"/>
-              <a:t>8/11/2017</a:t>
+              <a:t>9/7/2017</a:t>
             </a:fld>
             <a:endParaRPr lang="en-US"/>
           </a:p>
@@ -1821,7 +1821,7 @@
           <a:p>
             <a:fld id="{5075756A-E1AA-F843-BF52-05C1433C8A91}" type="datetimeFigureOut">
               <a:rPr lang="en-US" smtClean="0"/>
-              <a:t>8/11/2017</a:t>
+              <a:t>9/7/2017</a:t>
             </a:fld>
             <a:endParaRPr lang="en-US"/>
           </a:p>
@@ -2098,7 +2098,7 @@
           <a:p>
             <a:fld id="{5075756A-E1AA-F843-BF52-05C1433C8A91}" type="datetimeFigureOut">
               <a:rPr lang="en-US" smtClean="0"/>
-              <a:t>8/11/2017</a:t>
+              <a:t>9/7/2017</a:t>
             </a:fld>
             <a:endParaRPr lang="en-US"/>
           </a:p>
@@ -2351,7 +2351,7 @@
           <a:p>
             <a:fld id="{5075756A-E1AA-F843-BF52-05C1433C8A91}" type="datetimeFigureOut">
               <a:rPr lang="en-US" smtClean="0"/>
-              <a:t>8/11/2017</a:t>
+              <a:t>9/7/2017</a:t>
             </a:fld>
             <a:endParaRPr lang="en-US"/>
           </a:p>
@@ -2564,7 +2564,7 @@
           <a:p>
             <a:fld id="{5075756A-E1AA-F843-BF52-05C1433C8A91}" type="datetimeFigureOut">
               <a:rPr lang="en-US" smtClean="0"/>
-              <a:t>8/11/2017</a:t>
+              <a:t>9/7/2017</a:t>
             </a:fld>
             <a:endParaRPr lang="en-US"/>
           </a:p>
@@ -4629,6 +4629,97 @@
           </p:spPr>
         </p:pic>
       </p:grpSp>
+      <p:grpSp>
+        <p:nvGrpSpPr>
+          <p:cNvPr id="3" name="Group 2"/>
+          <p:cNvGrpSpPr/>
+          <p:nvPr/>
+        </p:nvGrpSpPr>
+        <p:grpSpPr>
+          <a:xfrm>
+            <a:off x="10015919" y="3164228"/>
+            <a:ext cx="1053379" cy="1106701"/>
+            <a:chOff x="10015919" y="3164228"/>
+            <a:chExt cx="1053379" cy="1106701"/>
+          </a:xfrm>
+        </p:grpSpPr>
+        <p:pic>
+          <p:nvPicPr>
+            <p:cNvPr id="44" name="Picture 43" descr="CloudWatch.png"/>
+            <p:cNvPicPr>
+              <a:picLocks noChangeAspect="1"/>
+            </p:cNvPicPr>
+            <p:nvPr/>
+          </p:nvPicPr>
+          <p:blipFill>
+            <a:blip r:embed="rId11">
+              <a:extLst>
+                <a:ext uri="{28A0092B-C50C-407E-A947-70E740481C1C}">
+                  <a14:useLocalDpi xmlns:a14="http://schemas.microsoft.com/office/drawing/2010/main" val="0"/>
+                </a:ext>
+              </a:extLst>
+            </a:blip>
+            <a:stretch>
+              <a:fillRect/>
+            </a:stretch>
+          </p:blipFill>
+          <p:spPr>
+            <a:xfrm>
+              <a:off x="10176849" y="3164228"/>
+              <a:ext cx="731520" cy="731520"/>
+            </a:xfrm>
+            <a:prstGeom prst="rect">
+              <a:avLst/>
+            </a:prstGeom>
+          </p:spPr>
+        </p:pic>
+        <p:sp>
+          <p:nvSpPr>
+            <p:cNvPr id="2" name="TextBox 1"/>
+            <p:cNvSpPr txBox="1"/>
+            <p:nvPr/>
+          </p:nvSpPr>
+          <p:spPr>
+            <a:xfrm>
+              <a:off x="10015919" y="3870819"/>
+              <a:ext cx="1053379" cy="400110"/>
+            </a:xfrm>
+            <a:prstGeom prst="rect">
+              <a:avLst/>
+            </a:prstGeom>
+            <a:noFill/>
+          </p:spPr>
+          <p:txBody>
+            <a:bodyPr wrap="square" rtlCol="0">
+              <a:spAutoFit/>
+            </a:bodyPr>
+            <a:lstStyle/>
+            <a:p>
+              <a:r>
+                <a:rPr lang="en-US" sz="1000" b="1" dirty="0" smtClean="0">
+                  <a:latin typeface="Verdana" panose="020B0604030504040204" pitchFamily="34" charset="0"/>
+                  <a:ea typeface="Verdana" panose="020B0604030504040204" pitchFamily="34" charset="0"/>
+                  <a:cs typeface="Verdana" panose="020B0604030504040204" pitchFamily="34" charset="0"/>
+                </a:rPr>
+                <a:t>Amazon </a:t>
+              </a:r>
+              <a:r>
+                <a:rPr lang="en-US" sz="1000" b="1" dirty="0" err="1" smtClean="0">
+                  <a:latin typeface="Verdana" panose="020B0604030504040204" pitchFamily="34" charset="0"/>
+                  <a:ea typeface="Verdana" panose="020B0604030504040204" pitchFamily="34" charset="0"/>
+                  <a:cs typeface="Verdana" panose="020B0604030504040204" pitchFamily="34" charset="0"/>
+                </a:rPr>
+                <a:t>CloudWatch</a:t>
+              </a:r>
+              <a:endParaRPr lang="en-US" sz="1000" b="1" dirty="0">
+                <a:latin typeface="Verdana" panose="020B0604030504040204" pitchFamily="34" charset="0"/>
+                <a:ea typeface="Verdana" panose="020B0604030504040204" pitchFamily="34" charset="0"/>
+                <a:cs typeface="Verdana" panose="020B0604030504040204" pitchFamily="34" charset="0"/>
+              </a:endParaRPr>
+            </a:p>
+          </p:txBody>
+        </p:sp>
+      </p:grpSp>
     </p:spTree>
     <p:extLst>
       <p:ext uri="{BB962C8B-B14F-4D97-AF65-F5344CB8AC3E}">

</xml_diff>

<commit_message>
Initial README. Updated arch diagram
</commit_message>
<xml_diff>
--- a/doc/Quick Start architecture diagram.pptx
+++ b/doc/Quick Start architecture diagram.pptx
@@ -2969,572 +2969,512 @@
           <a:chExt cx="0" cy="0"/>
         </a:xfrm>
       </p:grpSpPr>
-      <p:grpSp>
-        <p:nvGrpSpPr>
-          <p:cNvPr id="9" name="Group 8"/>
-          <p:cNvGrpSpPr/>
+      <p:sp>
+        <p:nvSpPr>
+          <p:cNvPr id="11" name="Rounded Rectangle 10"/>
+          <p:cNvSpPr/>
           <p:nvPr/>
-        </p:nvGrpSpPr>
-        <p:grpSpPr>
-          <a:xfrm>
-            <a:off x="1845568" y="144242"/>
-            <a:ext cx="9346233" cy="6524300"/>
-            <a:chOff x="1871664" y="243294"/>
-            <a:chExt cx="8676930" cy="6099535"/>
-          </a:xfrm>
-        </p:grpSpPr>
-        <p:sp>
-          <p:nvSpPr>
-            <p:cNvPr id="11" name="Rounded Rectangle 10"/>
-            <p:cNvSpPr/>
-            <p:nvPr/>
-          </p:nvSpPr>
-          <p:spPr>
-            <a:xfrm>
-              <a:off x="2173415" y="1029020"/>
-              <a:ext cx="4447246" cy="4759183"/>
-            </a:xfrm>
-            <a:prstGeom prst="roundRect">
-              <a:avLst>
-                <a:gd name="adj" fmla="val 9818"/>
-              </a:avLst>
-            </a:prstGeom>
+        </p:nvSpPr>
+        <p:spPr>
+          <a:xfrm>
+            <a:off x="2281167" y="725462"/>
+            <a:ext cx="5187121" cy="5726938"/>
+          </a:xfrm>
+          <a:prstGeom prst="roundRect">
+            <a:avLst>
+              <a:gd name="adj" fmla="val 9818"/>
+            </a:avLst>
+          </a:prstGeom>
+          <a:solidFill>
+            <a:srgbClr val="FFFFE5">
+              <a:alpha val="80000"/>
+            </a:srgbClr>
+          </a:solidFill>
+          <a:ln w="6350">
             <a:solidFill>
-              <a:srgbClr val="FFFFE5">
-                <a:alpha val="80000"/>
-              </a:srgbClr>
+              <a:schemeClr val="tx1"/>
             </a:solidFill>
-            <a:ln w="6350">
+            <a:prstDash val="solid"/>
+          </a:ln>
+          <a:effectLst/>
+        </p:spPr>
+        <p:style>
+          <a:lnRef idx="1">
+            <a:schemeClr val="accent1"/>
+          </a:lnRef>
+          <a:fillRef idx="3">
+            <a:schemeClr val="accent1"/>
+          </a:fillRef>
+          <a:effectRef idx="2">
+            <a:schemeClr val="accent1"/>
+          </a:effectRef>
+          <a:fontRef idx="minor">
+            <a:schemeClr val="lt1"/>
+          </a:fontRef>
+        </p:style>
+        <p:txBody>
+          <a:bodyPr anchor="ctr"/>
+          <a:lstStyle/>
+          <a:p>
+            <a:pPr algn="ctr" fontAlgn="auto">
+              <a:spcBef>
+                <a:spcPts val="0"/>
+              </a:spcBef>
+              <a:spcAft>
+                <a:spcPts val="0"/>
+              </a:spcAft>
+              <a:defRPr/>
+            </a:pPr>
+            <a:endParaRPr lang="en-US" sz="1400" dirty="0">
               <a:solidFill>
                 <a:schemeClr val="tx1"/>
               </a:solidFill>
-              <a:prstDash val="solid"/>
-            </a:ln>
-            <a:effectLst/>
-          </p:spPr>
-          <p:style>
-            <a:lnRef idx="1">
-              <a:schemeClr val="accent1"/>
-            </a:lnRef>
-            <a:fillRef idx="3">
-              <a:schemeClr val="accent1"/>
-            </a:fillRef>
-            <a:effectRef idx="2">
-              <a:schemeClr val="accent1"/>
-            </a:effectRef>
-            <a:fontRef idx="minor">
-              <a:schemeClr val="lt1"/>
-            </a:fontRef>
-          </p:style>
-          <p:txBody>
-            <a:bodyPr anchor="ctr"/>
-            <a:lstStyle/>
-            <a:p>
-              <a:pPr algn="ctr" fontAlgn="auto">
-                <a:spcBef>
-                  <a:spcPts val="0"/>
-                </a:spcBef>
-                <a:spcAft>
-                  <a:spcPts val="0"/>
-                </a:spcAft>
-                <a:defRPr/>
-              </a:pPr>
-              <a:endParaRPr lang="en-US" sz="1400" dirty="0">
-                <a:solidFill>
-                  <a:schemeClr val="tx1"/>
-                </a:solidFill>
-                <a:latin typeface="Arial"/>
-                <a:cs typeface="Arial"/>
-              </a:endParaRPr>
-            </a:p>
-          </p:txBody>
-        </p:sp>
-        <p:sp>
-          <p:nvSpPr>
-            <p:cNvPr id="13" name="Rounded Rectangle 12"/>
-            <p:cNvSpPr/>
-            <p:nvPr/>
-          </p:nvSpPr>
-          <p:spPr>
-            <a:xfrm>
-              <a:off x="2475166" y="637249"/>
-              <a:ext cx="3131549" cy="5486049"/>
-            </a:xfrm>
-            <a:prstGeom prst="roundRect">
-              <a:avLst>
-                <a:gd name="adj" fmla="val 9818"/>
-              </a:avLst>
-            </a:prstGeom>
+              <a:latin typeface="Arial"/>
+              <a:cs typeface="Arial"/>
+            </a:endParaRPr>
+          </a:p>
+        </p:txBody>
+      </p:sp>
+      <p:sp>
+        <p:nvSpPr>
+          <p:cNvPr id="13" name="Rounded Rectangle 12"/>
+          <p:cNvSpPr/>
+          <p:nvPr/>
+        </p:nvSpPr>
+        <p:spPr>
+          <a:xfrm>
+            <a:off x="2606194" y="1276690"/>
+            <a:ext cx="3297896" cy="4335107"/>
+          </a:xfrm>
+          <a:prstGeom prst="roundRect">
+            <a:avLst>
+              <a:gd name="adj" fmla="val 9818"/>
+            </a:avLst>
+          </a:prstGeom>
+          <a:solidFill>
+            <a:srgbClr val="FFE9CF">
+              <a:alpha val="40000"/>
+            </a:srgbClr>
+          </a:solidFill>
+          <a:ln w="19050">
             <a:solidFill>
-              <a:srgbClr val="FFE9CF">
-                <a:alpha val="40000"/>
-              </a:srgbClr>
+              <a:srgbClr val="F7981F"/>
             </a:solidFill>
-            <a:ln w="19050">
-              <a:solidFill>
-                <a:srgbClr val="F7981F"/>
-              </a:solidFill>
-              <a:prstDash val="lgDash"/>
-            </a:ln>
-            <a:effectLst/>
-          </p:spPr>
-          <p:style>
-            <a:lnRef idx="1">
-              <a:schemeClr val="accent1"/>
-            </a:lnRef>
-            <a:fillRef idx="3">
-              <a:schemeClr val="accent1"/>
-            </a:fillRef>
-            <a:effectRef idx="2">
-              <a:schemeClr val="accent1"/>
-            </a:effectRef>
-            <a:fontRef idx="minor">
-              <a:schemeClr val="lt1"/>
-            </a:fontRef>
-          </p:style>
-          <p:txBody>
-            <a:bodyPr anchor="ctr"/>
-            <a:lstStyle/>
-            <a:p>
-              <a:pPr algn="ctr" fontAlgn="auto">
-                <a:spcBef>
-                  <a:spcPts val="0"/>
-                </a:spcBef>
-                <a:spcAft>
-                  <a:spcPts val="0"/>
-                </a:spcAft>
-                <a:defRPr/>
-              </a:pPr>
-              <a:endParaRPr lang="en-US" sz="1400" dirty="0">
-                <a:solidFill>
-                  <a:schemeClr val="tx1"/>
-                </a:solidFill>
-                <a:latin typeface="Helvetica Neue"/>
-                <a:cs typeface="Helvetica Neue"/>
-              </a:endParaRPr>
-            </a:p>
-          </p:txBody>
-        </p:sp>
-        <p:sp>
-          <p:nvSpPr>
-            <p:cNvPr id="4" name="Rounded Rectangle 3"/>
-            <p:cNvSpPr/>
-            <p:nvPr/>
-          </p:nvSpPr>
-          <p:spPr>
-            <a:xfrm>
-              <a:off x="1871664" y="414779"/>
-              <a:ext cx="8676930" cy="5920033"/>
-            </a:xfrm>
-            <a:prstGeom prst="roundRect">
-              <a:avLst>
-                <a:gd name="adj" fmla="val 9818"/>
-              </a:avLst>
-            </a:prstGeom>
-            <a:noFill/>
-            <a:ln w="6350">
+            <a:prstDash val="lgDash"/>
+          </a:ln>
+          <a:effectLst/>
+        </p:spPr>
+        <p:style>
+          <a:lnRef idx="1">
+            <a:schemeClr val="accent1"/>
+          </a:lnRef>
+          <a:fillRef idx="3">
+            <a:schemeClr val="accent1"/>
+          </a:fillRef>
+          <a:effectRef idx="2">
+            <a:schemeClr val="accent1"/>
+          </a:effectRef>
+          <a:fontRef idx="minor">
+            <a:schemeClr val="lt1"/>
+          </a:fontRef>
+        </p:style>
+        <p:txBody>
+          <a:bodyPr anchor="ctr"/>
+          <a:lstStyle/>
+          <a:p>
+            <a:pPr algn="ctr" fontAlgn="auto">
+              <a:spcBef>
+                <a:spcPts val="0"/>
+              </a:spcBef>
+              <a:spcAft>
+                <a:spcPts val="0"/>
+              </a:spcAft>
+              <a:defRPr/>
+            </a:pPr>
+            <a:endParaRPr lang="en-US" sz="1400" dirty="0">
               <a:solidFill>
                 <a:schemeClr val="tx1"/>
               </a:solidFill>
-              <a:prstDash val="solid"/>
-            </a:ln>
-            <a:effectLst/>
-          </p:spPr>
-          <p:style>
-            <a:lnRef idx="1">
-              <a:schemeClr val="accent1"/>
-            </a:lnRef>
-            <a:fillRef idx="3">
-              <a:schemeClr val="accent1"/>
-            </a:fillRef>
-            <a:effectRef idx="2">
-              <a:schemeClr val="accent1"/>
-            </a:effectRef>
-            <a:fontRef idx="minor">
-              <a:schemeClr val="lt1"/>
-            </a:fontRef>
-          </p:style>
-          <p:txBody>
-            <a:bodyPr anchor="ctr"/>
-            <a:lstStyle/>
-            <a:p>
-              <a:pPr algn="ctr" fontAlgn="auto">
-                <a:spcBef>
-                  <a:spcPts val="0"/>
-                </a:spcBef>
-                <a:spcAft>
-                  <a:spcPts val="0"/>
-                </a:spcAft>
-                <a:defRPr/>
-              </a:pPr>
-              <a:endParaRPr lang="en-US" sz="1400" dirty="0">
-                <a:solidFill>
-                  <a:schemeClr val="tx1"/>
-                </a:solidFill>
-                <a:latin typeface="Helvetica Neue"/>
-                <a:cs typeface="Helvetica Neue"/>
-              </a:endParaRPr>
-            </a:p>
-          </p:txBody>
-        </p:sp>
-        <p:sp>
-          <p:nvSpPr>
-            <p:cNvPr id="5" name="TextBox 33"/>
-            <p:cNvSpPr txBox="1">
-              <a:spLocks noChangeArrowheads="1"/>
-            </p:cNvSpPr>
-            <p:nvPr/>
-          </p:nvSpPr>
-          <p:spPr bwMode="auto">
-            <a:xfrm>
-              <a:off x="5064911" y="6098251"/>
-              <a:ext cx="1555750" cy="244578"/>
-            </a:xfrm>
-            <a:prstGeom prst="rect">
-              <a:avLst/>
-            </a:prstGeom>
+              <a:latin typeface="Helvetica Neue"/>
+              <a:cs typeface="Helvetica Neue"/>
+            </a:endParaRPr>
+          </a:p>
+        </p:txBody>
+      </p:sp>
+      <p:sp>
+        <p:nvSpPr>
+          <p:cNvPr id="4" name="Rounded Rectangle 3"/>
+          <p:cNvSpPr/>
+          <p:nvPr/>
+        </p:nvSpPr>
+        <p:spPr>
+          <a:xfrm>
+            <a:off x="1956140" y="381712"/>
+            <a:ext cx="5703617" cy="6332298"/>
+          </a:xfrm>
+          <a:prstGeom prst="roundRect">
+            <a:avLst>
+              <a:gd name="adj" fmla="val 9818"/>
+            </a:avLst>
+          </a:prstGeom>
+          <a:noFill/>
+          <a:ln w="6350">
+            <a:solidFill>
+              <a:schemeClr val="tx1"/>
+            </a:solidFill>
+            <a:prstDash val="solid"/>
+          </a:ln>
+          <a:effectLst/>
+        </p:spPr>
+        <p:style>
+          <a:lnRef idx="1">
+            <a:schemeClr val="accent1"/>
+          </a:lnRef>
+          <a:fillRef idx="3">
+            <a:schemeClr val="accent1"/>
+          </a:fillRef>
+          <a:effectRef idx="2">
+            <a:schemeClr val="accent1"/>
+          </a:effectRef>
+          <a:fontRef idx="minor">
+            <a:schemeClr val="lt1"/>
+          </a:fontRef>
+        </p:style>
+        <p:txBody>
+          <a:bodyPr anchor="ctr"/>
+          <a:lstStyle/>
+          <a:p>
+            <a:pPr algn="ctr" fontAlgn="auto">
+              <a:spcBef>
+                <a:spcPts val="0"/>
+              </a:spcBef>
+              <a:spcAft>
+                <a:spcPts val="0"/>
+              </a:spcAft>
+              <a:defRPr/>
+            </a:pPr>
+            <a:endParaRPr lang="en-US" sz="1400" dirty="0">
+              <a:solidFill>
+                <a:schemeClr val="tx1"/>
+              </a:solidFill>
+              <a:latin typeface="Helvetica Neue"/>
+              <a:cs typeface="Helvetica Neue"/>
+            </a:endParaRPr>
+          </a:p>
+        </p:txBody>
+      </p:sp>
+      <p:sp>
+        <p:nvSpPr>
+          <p:cNvPr id="5" name="TextBox 33"/>
+          <p:cNvSpPr txBox="1">
+            <a:spLocks noChangeArrowheads="1"/>
+          </p:cNvSpPr>
+          <p:nvPr/>
+        </p:nvSpPr>
+        <p:spPr bwMode="auto">
+          <a:xfrm>
+            <a:off x="5395701" y="6460975"/>
+            <a:ext cx="1675754" cy="261610"/>
+          </a:xfrm>
+          <a:prstGeom prst="rect">
+            <a:avLst/>
+          </a:prstGeom>
+          <a:noFill/>
+          <a:ln w="9525">
             <a:noFill/>
-            <a:ln w="9525">
-              <a:noFill/>
-              <a:miter lim="800000"/>
-              <a:headEnd/>
-              <a:tailEnd/>
-            </a:ln>
-          </p:spPr>
-          <p:txBody>
-            <a:bodyPr>
-              <a:spAutoFit/>
-            </a:bodyPr>
-            <a:lstStyle/>
-            <a:p>
-              <a:pPr algn="ctr"/>
-              <a:r>
-                <a:rPr lang="en-US" sz="1100" dirty="0" smtClean="0">
-                  <a:latin typeface="Verdana" panose="020B0604030504040204" pitchFamily="34" charset="0"/>
-                  <a:ea typeface="Verdana" panose="020B0604030504040204" pitchFamily="34" charset="0"/>
-                  <a:cs typeface="Verdana" panose="020B0604030504040204" pitchFamily="34" charset="0"/>
-                </a:rPr>
-                <a:t>AWS Region</a:t>
-              </a:r>
-              <a:endParaRPr lang="en-US" sz="1100" dirty="0">
+            <a:miter lim="800000"/>
+            <a:headEnd/>
+            <a:tailEnd/>
+          </a:ln>
+        </p:spPr>
+        <p:txBody>
+          <a:bodyPr>
+            <a:spAutoFit/>
+          </a:bodyPr>
+          <a:lstStyle/>
+          <a:p>
+            <a:pPr algn="ctr"/>
+            <a:r>
+              <a:rPr lang="en-US" sz="1100" dirty="0" smtClean="0">
                 <a:latin typeface="Verdana" panose="020B0604030504040204" pitchFamily="34" charset="0"/>
                 <a:ea typeface="Verdana" panose="020B0604030504040204" pitchFamily="34" charset="0"/>
                 <a:cs typeface="Verdana" panose="020B0604030504040204" pitchFamily="34" charset="0"/>
-              </a:endParaRPr>
-            </a:p>
-          </p:txBody>
-        </p:sp>
-        <p:pic>
-          <p:nvPicPr>
-            <p:cNvPr id="10" name="Picture 9"/>
-            <p:cNvPicPr>
-              <a:picLocks noChangeAspect="1"/>
-            </p:cNvPicPr>
-            <p:nvPr/>
-          </p:nvPicPr>
-          <p:blipFill>
-            <a:blip r:embed="rId2">
-              <a:extLst>
-                <a:ext uri="{28A0092B-C50C-407E-A947-70E740481C1C}">
-                  <a14:useLocalDpi xmlns:a14="http://schemas.microsoft.com/office/drawing/2010/main" val="0"/>
-                </a:ext>
-              </a:extLst>
-            </a:blip>
-            <a:stretch>
-              <a:fillRect/>
-            </a:stretch>
-          </p:blipFill>
-          <p:spPr>
-            <a:xfrm>
-              <a:off x="1956504" y="243294"/>
-              <a:ext cx="603504" cy="393954"/>
-            </a:xfrm>
-            <a:prstGeom prst="rect">
-              <a:avLst/>
-            </a:prstGeom>
-          </p:spPr>
-        </p:pic>
-        <p:sp>
-          <p:nvSpPr>
-            <p:cNvPr id="15" name="Rounded Rectangle 14"/>
-            <p:cNvSpPr/>
-            <p:nvPr/>
-          </p:nvSpPr>
-          <p:spPr>
-            <a:xfrm>
-              <a:off x="2816482" y="1420540"/>
-              <a:ext cx="2589798" cy="1703348"/>
-            </a:xfrm>
-            <a:prstGeom prst="roundRect">
-              <a:avLst>
-                <a:gd name="adj" fmla="val 9818"/>
-              </a:avLst>
-            </a:prstGeom>
+              </a:rPr>
+              <a:t>AWS Region</a:t>
+            </a:r>
+            <a:endParaRPr lang="en-US" sz="1100" dirty="0">
+              <a:latin typeface="Verdana" panose="020B0604030504040204" pitchFamily="34" charset="0"/>
+              <a:ea typeface="Verdana" panose="020B0604030504040204" pitchFamily="34" charset="0"/>
+              <a:cs typeface="Verdana" panose="020B0604030504040204" pitchFamily="34" charset="0"/>
+            </a:endParaRPr>
+          </a:p>
+        </p:txBody>
+      </p:sp>
+      <p:pic>
+        <p:nvPicPr>
+          <p:cNvPr id="10" name="Picture 9"/>
+          <p:cNvPicPr>
+            <a:picLocks noChangeAspect="1"/>
+          </p:cNvPicPr>
+          <p:nvPr/>
+        </p:nvPicPr>
+        <p:blipFill>
+          <a:blip r:embed="rId2">
+            <a:extLst>
+              <a:ext uri="{28A0092B-C50C-407E-A947-70E740481C1C}">
+                <a14:useLocalDpi xmlns:a14="http://schemas.microsoft.com/office/drawing/2010/main" val="0"/>
+              </a:ext>
+            </a:extLst>
+          </a:blip>
+          <a:stretch>
+            <a:fillRect/>
+          </a:stretch>
+        </p:blipFill>
+        <p:spPr>
+          <a:xfrm>
+            <a:off x="2047524" y="198285"/>
+            <a:ext cx="650056" cy="421389"/>
+          </a:xfrm>
+          <a:prstGeom prst="rect">
+            <a:avLst/>
+          </a:prstGeom>
+        </p:spPr>
+      </p:pic>
+      <p:sp>
+        <p:nvSpPr>
+          <p:cNvPr id="15" name="Rounded Rectangle 14"/>
+          <p:cNvSpPr/>
+          <p:nvPr/>
+        </p:nvSpPr>
+        <p:spPr>
+          <a:xfrm>
+            <a:off x="2973837" y="1457513"/>
+            <a:ext cx="2789564" cy="1821967"/>
+          </a:xfrm>
+          <a:prstGeom prst="roundRect">
+            <a:avLst>
+              <a:gd name="adj" fmla="val 9818"/>
+            </a:avLst>
+          </a:prstGeom>
+          <a:solidFill>
+            <a:srgbClr val="D2D9CA"/>
+          </a:solidFill>
+          <a:ln w="6350">
             <a:solidFill>
-              <a:srgbClr val="D2D9CA"/>
+              <a:schemeClr val="tx1"/>
             </a:solidFill>
-            <a:ln w="6350">
+            <a:prstDash val="solid"/>
+          </a:ln>
+          <a:effectLst/>
+        </p:spPr>
+        <p:style>
+          <a:lnRef idx="1">
+            <a:schemeClr val="accent1"/>
+          </a:lnRef>
+          <a:fillRef idx="3">
+            <a:schemeClr val="accent1"/>
+          </a:fillRef>
+          <a:effectRef idx="2">
+            <a:schemeClr val="accent1"/>
+          </a:effectRef>
+          <a:fontRef idx="minor">
+            <a:schemeClr val="lt1"/>
+          </a:fontRef>
+        </p:style>
+        <p:txBody>
+          <a:bodyPr anchor="ctr"/>
+          <a:lstStyle/>
+          <a:p>
+            <a:pPr algn="ctr" fontAlgn="auto">
+              <a:spcBef>
+                <a:spcPts val="0"/>
+              </a:spcBef>
+              <a:spcAft>
+                <a:spcPts val="0"/>
+              </a:spcAft>
+              <a:defRPr/>
+            </a:pPr>
+            <a:endParaRPr lang="en-US" sz="1400" dirty="0">
               <a:solidFill>
                 <a:schemeClr val="tx1"/>
               </a:solidFill>
-              <a:prstDash val="solid"/>
-            </a:ln>
-            <a:effectLst/>
-          </p:spPr>
-          <p:style>
-            <a:lnRef idx="1">
-              <a:schemeClr val="accent1"/>
-            </a:lnRef>
-            <a:fillRef idx="3">
-              <a:schemeClr val="accent1"/>
-            </a:fillRef>
-            <a:effectRef idx="2">
-              <a:schemeClr val="accent1"/>
-            </a:effectRef>
-            <a:fontRef idx="minor">
-              <a:schemeClr val="lt1"/>
-            </a:fontRef>
-          </p:style>
-          <p:txBody>
-            <a:bodyPr anchor="ctr"/>
-            <a:lstStyle/>
-            <a:p>
-              <a:pPr algn="ctr" fontAlgn="auto">
-                <a:spcBef>
-                  <a:spcPts val="0"/>
-                </a:spcBef>
-                <a:spcAft>
-                  <a:spcPts val="0"/>
-                </a:spcAft>
-                <a:defRPr/>
-              </a:pPr>
-              <a:endParaRPr lang="en-US" sz="1400" dirty="0">
-                <a:solidFill>
-                  <a:schemeClr val="tx1"/>
-                </a:solidFill>
-                <a:latin typeface="Helvetica Neue"/>
-                <a:cs typeface="Helvetica Neue"/>
-              </a:endParaRPr>
-            </a:p>
-          </p:txBody>
-        </p:sp>
-        <p:sp>
-          <p:nvSpPr>
-            <p:cNvPr id="16" name="Rounded Rectangle 15"/>
-            <p:cNvSpPr/>
-            <p:nvPr/>
-          </p:nvSpPr>
-          <p:spPr>
-            <a:xfrm>
-              <a:off x="2746041" y="3200533"/>
-              <a:ext cx="2589798" cy="2341554"/>
-            </a:xfrm>
-            <a:prstGeom prst="roundRect">
-              <a:avLst>
-                <a:gd name="adj" fmla="val 9818"/>
-              </a:avLst>
-            </a:prstGeom>
+              <a:latin typeface="Helvetica Neue"/>
+              <a:cs typeface="Helvetica Neue"/>
+            </a:endParaRPr>
+          </a:p>
+        </p:txBody>
+      </p:sp>
+      <p:sp>
+        <p:nvSpPr>
+          <p:cNvPr id="16" name="Rounded Rectangle 15"/>
+          <p:cNvSpPr/>
+          <p:nvPr/>
+        </p:nvSpPr>
+        <p:spPr>
+          <a:xfrm>
+            <a:off x="2897963" y="3361464"/>
+            <a:ext cx="2789564" cy="2044498"/>
+          </a:xfrm>
+          <a:prstGeom prst="roundRect">
+            <a:avLst>
+              <a:gd name="adj" fmla="val 9818"/>
+            </a:avLst>
+          </a:prstGeom>
+          <a:solidFill>
+            <a:srgbClr val="CBD5E9"/>
+          </a:solidFill>
+          <a:ln w="6350">
             <a:solidFill>
-              <a:srgbClr val="CBD5E9"/>
+              <a:schemeClr val="tx1"/>
             </a:solidFill>
-            <a:ln w="6350">
+            <a:prstDash val="solid"/>
+          </a:ln>
+          <a:effectLst/>
+        </p:spPr>
+        <p:style>
+          <a:lnRef idx="1">
+            <a:schemeClr val="accent1"/>
+          </a:lnRef>
+          <a:fillRef idx="3">
+            <a:schemeClr val="accent1"/>
+          </a:fillRef>
+          <a:effectRef idx="2">
+            <a:schemeClr val="accent1"/>
+          </a:effectRef>
+          <a:fontRef idx="minor">
+            <a:schemeClr val="lt1"/>
+          </a:fontRef>
+        </p:style>
+        <p:txBody>
+          <a:bodyPr anchor="ctr"/>
+          <a:lstStyle/>
+          <a:p>
+            <a:pPr algn="ctr" fontAlgn="auto">
+              <a:spcBef>
+                <a:spcPts val="0"/>
+              </a:spcBef>
+              <a:spcAft>
+                <a:spcPts val="0"/>
+              </a:spcAft>
+              <a:defRPr/>
+            </a:pPr>
+            <a:endParaRPr lang="en-US" sz="1400" dirty="0">
               <a:solidFill>
                 <a:schemeClr val="tx1"/>
               </a:solidFill>
-              <a:prstDash val="solid"/>
-            </a:ln>
-            <a:effectLst/>
-          </p:spPr>
-          <p:style>
-            <a:lnRef idx="1">
-              <a:schemeClr val="accent1"/>
-            </a:lnRef>
-            <a:fillRef idx="3">
-              <a:schemeClr val="accent1"/>
-            </a:fillRef>
-            <a:effectRef idx="2">
-              <a:schemeClr val="accent1"/>
-            </a:effectRef>
-            <a:fontRef idx="minor">
-              <a:schemeClr val="lt1"/>
-            </a:fontRef>
-          </p:style>
-          <p:txBody>
-            <a:bodyPr anchor="ctr"/>
-            <a:lstStyle/>
-            <a:p>
-              <a:pPr algn="ctr" fontAlgn="auto">
-                <a:spcBef>
-                  <a:spcPts val="0"/>
-                </a:spcBef>
-                <a:spcAft>
-                  <a:spcPts val="0"/>
-                </a:spcAft>
-                <a:defRPr/>
-              </a:pPr>
-              <a:endParaRPr lang="en-US" sz="1400" dirty="0">
-                <a:solidFill>
-                  <a:schemeClr val="tx1"/>
-                </a:solidFill>
-                <a:latin typeface="Helvetica Neue"/>
-                <a:cs typeface="Helvetica Neue"/>
-              </a:endParaRPr>
-            </a:p>
-          </p:txBody>
-        </p:sp>
-        <p:pic>
-          <p:nvPicPr>
-            <p:cNvPr id="19" name="Picture 18"/>
-            <p:cNvPicPr>
-              <a:picLocks noChangeAspect="1"/>
-            </p:cNvPicPr>
-            <p:nvPr/>
-          </p:nvPicPr>
-          <p:blipFill>
-            <a:blip r:embed="rId3">
-              <a:extLst>
-                <a:ext uri="{28A0092B-C50C-407E-A947-70E740481C1C}">
-                  <a14:useLocalDpi xmlns:a14="http://schemas.microsoft.com/office/drawing/2010/main" val="0"/>
-                </a:ext>
-              </a:extLst>
-            </a:blip>
-            <a:stretch>
-              <a:fillRect/>
-            </a:stretch>
-          </p:blipFill>
-          <p:spPr>
-            <a:xfrm>
-              <a:off x="5606178" y="750603"/>
-              <a:ext cx="538196" cy="564238"/>
-            </a:xfrm>
-            <a:prstGeom prst="rect">
-              <a:avLst/>
-            </a:prstGeom>
-          </p:spPr>
-        </p:pic>
-        <p:sp>
-          <p:nvSpPr>
-            <p:cNvPr id="39" name="TextBox 38"/>
-            <p:cNvSpPr txBox="1"/>
-            <p:nvPr/>
-          </p:nvSpPr>
-          <p:spPr>
-            <a:xfrm>
-              <a:off x="3303337" y="5887101"/>
-              <a:ext cx="1429352" cy="130680"/>
-            </a:xfrm>
-            <a:prstGeom prst="rect">
-              <a:avLst/>
-            </a:prstGeom>
-            <a:noFill/>
-          </p:spPr>
-          <p:txBody>
-            <a:bodyPr wrap="square" lIns="0" tIns="0" rIns="0" bIns="0" rtlCol="0" anchor="t">
-              <a:noAutofit/>
-            </a:bodyPr>
-            <a:lstStyle/>
-            <a:p>
-              <a:pPr algn="ctr"/>
-              <a:r>
-                <a:rPr lang="en-US" sz="1100" b="1" dirty="0" smtClean="0">
-                  <a:solidFill>
-                    <a:srgbClr val="FAA634"/>
-                  </a:solidFill>
-                  <a:latin typeface="Verdana" panose="020B0604030504040204" pitchFamily="34" charset="0"/>
-                  <a:ea typeface="Verdana" panose="020B0604030504040204" pitchFamily="34" charset="0"/>
-                  <a:cs typeface="Verdana" panose="020B0604030504040204" pitchFamily="34" charset="0"/>
-                </a:rPr>
-                <a:t>Availability Zone 1</a:t>
-              </a:r>
-              <a:endParaRPr lang="en-US" sz="1100" b="1" dirty="0">
-                <a:solidFill>
-                  <a:srgbClr val="FAA634"/>
-                </a:solidFill>
+              <a:latin typeface="Helvetica Neue"/>
+              <a:cs typeface="Helvetica Neue"/>
+            </a:endParaRPr>
+          </a:p>
+        </p:txBody>
+      </p:sp>
+      <p:pic>
+        <p:nvPicPr>
+          <p:cNvPr id="19" name="Picture 18"/>
+          <p:cNvPicPr>
+            <a:picLocks noChangeAspect="1"/>
+          </p:cNvPicPr>
+          <p:nvPr/>
+        </p:nvPicPr>
+        <p:blipFill>
+          <a:blip r:embed="rId3">
+            <a:extLst>
+              <a:ext uri="{28A0092B-C50C-407E-A947-70E740481C1C}">
+                <a14:useLocalDpi xmlns:a14="http://schemas.microsoft.com/office/drawing/2010/main" val="0"/>
+              </a:ext>
+            </a:extLst>
+          </a:blip>
+          <a:stretch>
+            <a:fillRect/>
+          </a:stretch>
+        </p:blipFill>
+        <p:spPr>
+          <a:xfrm>
+            <a:off x="5838586" y="458135"/>
+            <a:ext cx="579710" cy="603531"/>
+          </a:xfrm>
+          <a:prstGeom prst="rect">
+            <a:avLst/>
+          </a:prstGeom>
+        </p:spPr>
+      </p:pic>
+      <p:sp>
+        <p:nvSpPr>
+          <p:cNvPr id="40" name="TextBox 39"/>
+          <p:cNvSpPr txBox="1"/>
+          <p:nvPr/>
+        </p:nvSpPr>
+        <p:spPr>
+          <a:xfrm>
+            <a:off x="7468288" y="6236920"/>
+            <a:ext cx="1491945" cy="230983"/>
+          </a:xfrm>
+          <a:prstGeom prst="rect">
+            <a:avLst/>
+          </a:prstGeom>
+          <a:noFill/>
+        </p:spPr>
+        <p:txBody>
+          <a:bodyPr wrap="square" lIns="0" tIns="0" rIns="0" bIns="0" rtlCol="0" anchor="t">
+            <a:noAutofit/>
+          </a:bodyPr>
+          <a:lstStyle/>
+          <a:p>
+            <a:pPr algn="ctr"/>
+            <a:endParaRPr lang="en-US" sz="1100" b="1" dirty="0">
+              <a:solidFill>
+                <a:srgbClr val="FAA634"/>
+              </a:solidFill>
+              <a:latin typeface="Verdana" panose="020B0604030504040204" pitchFamily="34" charset="0"/>
+              <a:ea typeface="Verdana" panose="020B0604030504040204" pitchFamily="34" charset="0"/>
+              <a:cs typeface="Verdana" panose="020B0604030504040204" pitchFamily="34" charset="0"/>
+            </a:endParaRPr>
+          </a:p>
+        </p:txBody>
+      </p:sp>
+      <p:sp>
+        <p:nvSpPr>
+          <p:cNvPr id="38" name="TextBox 37"/>
+          <p:cNvSpPr txBox="1"/>
+          <p:nvPr/>
+        </p:nvSpPr>
+        <p:spPr>
+          <a:xfrm>
+            <a:off x="5369190" y="1085888"/>
+            <a:ext cx="1261270" cy="195426"/>
+          </a:xfrm>
+          <a:prstGeom prst="rect">
+            <a:avLst/>
+          </a:prstGeom>
+          <a:solidFill>
+            <a:srgbClr val="FFFFE5">
+              <a:alpha val="25000"/>
+            </a:srgbClr>
+          </a:solidFill>
+        </p:spPr>
+        <p:txBody>
+          <a:bodyPr wrap="square" lIns="0" tIns="0" rIns="0" bIns="0" rtlCol="0" anchor="t">
+            <a:noAutofit/>
+          </a:bodyPr>
+          <a:lstStyle/>
+          <a:p>
+            <a:pPr algn="ctr"/>
+            <a:r>
+              <a:rPr lang="en-US" sz="1000" b="1" dirty="0" smtClean="0">
                 <a:latin typeface="Verdana" panose="020B0604030504040204" pitchFamily="34" charset="0"/>
                 <a:ea typeface="Verdana" panose="020B0604030504040204" pitchFamily="34" charset="0"/>
                 <a:cs typeface="Verdana" panose="020B0604030504040204" pitchFamily="34" charset="0"/>
-              </a:endParaRPr>
-            </a:p>
-          </p:txBody>
-        </p:sp>
-        <p:sp>
-          <p:nvSpPr>
-            <p:cNvPr id="40" name="TextBox 39"/>
-            <p:cNvSpPr txBox="1"/>
-            <p:nvPr/>
-          </p:nvSpPr>
-          <p:spPr>
-            <a:xfrm>
-              <a:off x="6989076" y="5888783"/>
-              <a:ext cx="1385104" cy="215945"/>
-            </a:xfrm>
-            <a:prstGeom prst="rect">
-              <a:avLst/>
-            </a:prstGeom>
-            <a:noFill/>
-          </p:spPr>
-          <p:txBody>
-            <a:bodyPr wrap="square" lIns="0" tIns="0" rIns="0" bIns="0" rtlCol="0" anchor="t">
-              <a:noAutofit/>
-            </a:bodyPr>
-            <a:lstStyle/>
-            <a:p>
-              <a:pPr algn="ctr"/>
-              <a:endParaRPr lang="en-US" sz="1100" b="1" dirty="0">
-                <a:solidFill>
-                  <a:srgbClr val="FAA634"/>
-                </a:solidFill>
-                <a:latin typeface="Verdana" panose="020B0604030504040204" pitchFamily="34" charset="0"/>
-                <a:ea typeface="Verdana" panose="020B0604030504040204" pitchFamily="34" charset="0"/>
-                <a:cs typeface="Verdana" panose="020B0604030504040204" pitchFamily="34" charset="0"/>
-              </a:endParaRPr>
-            </a:p>
-          </p:txBody>
-        </p:sp>
-        <p:sp>
-          <p:nvSpPr>
-            <p:cNvPr id="38" name="TextBox 37"/>
-            <p:cNvSpPr txBox="1"/>
-            <p:nvPr/>
-          </p:nvSpPr>
-          <p:spPr>
-            <a:xfrm>
-              <a:off x="6234787" y="828130"/>
-              <a:ext cx="1170948" cy="182703"/>
-            </a:xfrm>
-            <a:prstGeom prst="rect">
-              <a:avLst/>
-            </a:prstGeom>
-            <a:solidFill>
-              <a:srgbClr val="FFFFE5">
-                <a:alpha val="25000"/>
-              </a:srgbClr>
-            </a:solidFill>
-          </p:spPr>
-          <p:txBody>
-            <a:bodyPr wrap="square" lIns="0" tIns="0" rIns="0" bIns="0" rtlCol="0" anchor="t">
-              <a:noAutofit/>
-            </a:bodyPr>
-            <a:lstStyle/>
-            <a:p>
-              <a:pPr algn="ctr"/>
-              <a:r>
-                <a:rPr lang="en-US" sz="1000" b="1" dirty="0" smtClean="0">
-                  <a:latin typeface="Verdana" panose="020B0604030504040204" pitchFamily="34" charset="0"/>
-                  <a:ea typeface="Verdana" panose="020B0604030504040204" pitchFamily="34" charset="0"/>
-                  <a:cs typeface="Verdana" panose="020B0604030504040204" pitchFamily="34" charset="0"/>
-                </a:rPr>
-                <a:t>Internet gateway</a:t>
-              </a:r>
-              <a:endParaRPr lang="en-US" sz="1000" b="1" dirty="0">
-                <a:latin typeface="Verdana" panose="020B0604030504040204" pitchFamily="34" charset="0"/>
-                <a:ea typeface="Verdana" panose="020B0604030504040204" pitchFamily="34" charset="0"/>
-                <a:cs typeface="Verdana" panose="020B0604030504040204" pitchFamily="34" charset="0"/>
-              </a:endParaRPr>
-            </a:p>
-          </p:txBody>
-        </p:sp>
-      </p:grpSp>
+              </a:rPr>
+              <a:t>Internet gateway</a:t>
+            </a:r>
+            <a:endParaRPr lang="en-US" sz="1000" b="1" dirty="0">
+              <a:latin typeface="Verdana" panose="020B0604030504040204" pitchFamily="34" charset="0"/>
+              <a:ea typeface="Verdana" panose="020B0604030504040204" pitchFamily="34" charset="0"/>
+              <a:cs typeface="Verdana" panose="020B0604030504040204" pitchFamily="34" charset="0"/>
+            </a:endParaRPr>
+          </a:p>
+        </p:txBody>
+      </p:sp>
       <p:pic>
         <p:nvPicPr>
           <p:cNvPr id="62" name="Picture 61"/>
@@ -3557,7 +3497,7 @@
         </p:blipFill>
         <p:spPr>
           <a:xfrm>
-            <a:off x="2197401" y="879749"/>
+            <a:off x="2815194" y="524773"/>
             <a:ext cx="548640" cy="358140"/>
           </a:xfrm>
           <a:prstGeom prst="rect">
@@ -3575,7 +3515,7 @@
         </p:nvSpPr>
         <p:spPr bwMode="auto">
           <a:xfrm>
-            <a:off x="4755254" y="5847062"/>
+            <a:off x="3062837" y="6125504"/>
             <a:ext cx="2602462" cy="246221"/>
           </a:xfrm>
           <a:prstGeom prst="rect">
@@ -3616,90 +3556,6 @@
           </a:p>
         </p:txBody>
       </p:sp>
-      <p:pic>
-        <p:nvPicPr>
-          <p:cNvPr id="75" name="Picture 74"/>
-          <p:cNvPicPr>
-            <a:picLocks noChangeAspect="1"/>
-          </p:cNvPicPr>
-          <p:nvPr/>
-        </p:nvPicPr>
-        <p:blipFill>
-          <a:blip r:embed="rId5">
-            <a:extLst>
-              <a:ext uri="{28A0092B-C50C-407E-A947-70E740481C1C}">
-                <a14:useLocalDpi xmlns:a14="http://schemas.microsoft.com/office/drawing/2010/main" val="0"/>
-              </a:ext>
-            </a:extLst>
-          </a:blip>
-          <a:stretch>
-            <a:fillRect/>
-          </a:stretch>
-        </p:blipFill>
-        <p:spPr>
-          <a:xfrm>
-            <a:off x="10270951" y="1624756"/>
-            <a:ext cx="521367" cy="625641"/>
-          </a:xfrm>
-          <a:prstGeom prst="rect">
-            <a:avLst/>
-          </a:prstGeom>
-        </p:spPr>
-      </p:pic>
-      <p:sp>
-        <p:nvSpPr>
-          <p:cNvPr id="76" name="TextBox 75"/>
-          <p:cNvSpPr txBox="1"/>
-          <p:nvPr/>
-        </p:nvSpPr>
-        <p:spPr>
-          <a:xfrm>
-            <a:off x="10167392" y="2275618"/>
-            <a:ext cx="731520" cy="155632"/>
-          </a:xfrm>
-          <a:prstGeom prst="rect">
-            <a:avLst/>
-          </a:prstGeom>
-          <a:noFill/>
-        </p:spPr>
-        <p:txBody>
-          <a:bodyPr wrap="square" lIns="0" tIns="0" rIns="0" bIns="0" rtlCol="0" anchor="t">
-            <a:noAutofit/>
-          </a:bodyPr>
-          <a:lstStyle/>
-          <a:p>
-            <a:pPr algn="ctr"/>
-            <a:r>
-              <a:rPr lang="en-US" sz="1000" b="1" dirty="0" smtClean="0">
-                <a:latin typeface="Verdana" panose="020B0604030504040204" pitchFamily="34" charset="0"/>
-                <a:ea typeface="Verdana" panose="020B0604030504040204" pitchFamily="34" charset="0"/>
-                <a:cs typeface="Verdana" panose="020B0604030504040204" pitchFamily="34" charset="0"/>
-              </a:rPr>
-              <a:t>Amazon</a:t>
-            </a:r>
-            <a:br>
-              <a:rPr lang="en-US" sz="1000" b="1" dirty="0" smtClean="0">
-                <a:latin typeface="Verdana" panose="020B0604030504040204" pitchFamily="34" charset="0"/>
-                <a:ea typeface="Verdana" panose="020B0604030504040204" pitchFamily="34" charset="0"/>
-                <a:cs typeface="Verdana" panose="020B0604030504040204" pitchFamily="34" charset="0"/>
-              </a:rPr>
-            </a:br>
-            <a:r>
-              <a:rPr lang="en-US" sz="1000" b="1" dirty="0" smtClean="0">
-                <a:latin typeface="Verdana" panose="020B0604030504040204" pitchFamily="34" charset="0"/>
-                <a:ea typeface="Verdana" panose="020B0604030504040204" pitchFamily="34" charset="0"/>
-                <a:cs typeface="Verdana" panose="020B0604030504040204" pitchFamily="34" charset="0"/>
-              </a:rPr>
-              <a:t>S3</a:t>
-            </a:r>
-            <a:endParaRPr lang="en-US" sz="1000" b="1" dirty="0">
-              <a:latin typeface="Verdana" panose="020B0604030504040204" pitchFamily="34" charset="0"/>
-              <a:ea typeface="Verdana" panose="020B0604030504040204" pitchFamily="34" charset="0"/>
-              <a:cs typeface="Verdana" panose="020B0604030504040204" pitchFamily="34" charset="0"/>
-            </a:endParaRPr>
-          </a:p>
-        </p:txBody>
-      </p:sp>
       <p:grpSp>
         <p:nvGrpSpPr>
           <p:cNvPr id="6" name="Group 5"/>
@@ -3708,7 +3564,7 @@
         </p:nvGrpSpPr>
         <p:grpSpPr>
           <a:xfrm>
-            <a:off x="3169129" y="3475849"/>
+            <a:off x="4397493" y="3912877"/>
             <a:ext cx="1171148" cy="985987"/>
             <a:chOff x="3021085" y="3949159"/>
             <a:chExt cx="1171148" cy="985987"/>
@@ -3785,7 +3641,7 @@
             <p:nvPr/>
           </p:nvPicPr>
           <p:blipFill>
-            <a:blip r:embed="rId6">
+            <a:blip r:embed="rId5">
               <a:extLst>
                 <a:ext uri="{28A0092B-C50C-407E-A947-70E740481C1C}">
                   <a14:useLocalDpi xmlns:a14="http://schemas.microsoft.com/office/drawing/2010/main" val="0"/>
@@ -3815,7 +3671,7 @@
         </p:nvSpPr>
         <p:spPr>
           <a:xfrm>
-            <a:off x="3499201" y="2828833"/>
+            <a:off x="3806027" y="2895271"/>
             <a:ext cx="1136861" cy="400110"/>
           </a:xfrm>
           <a:prstGeom prst="rect">
@@ -3865,7 +3721,7 @@
         </p:nvSpPr>
         <p:spPr>
           <a:xfrm>
-            <a:off x="3459304" y="5430230"/>
+            <a:off x="3634995" y="4966136"/>
             <a:ext cx="1211702" cy="400110"/>
           </a:xfrm>
           <a:prstGeom prst="rect">
@@ -4032,14 +3888,14 @@
           <p:nvPr/>
         </p:nvPicPr>
         <p:blipFill>
-          <a:blip r:embed="rId7"/>
+          <a:blip r:embed="rId6"/>
           <a:stretch>
             <a:fillRect/>
           </a:stretch>
         </p:blipFill>
         <p:spPr>
           <a:xfrm>
-            <a:off x="3293586" y="1771375"/>
+            <a:off x="3531271" y="1863945"/>
             <a:ext cx="639765" cy="670560"/>
           </a:xfrm>
           <a:prstGeom prst="rect">
@@ -4055,7 +3911,7 @@
         </p:nvSpPr>
         <p:spPr>
           <a:xfrm>
-            <a:off x="3275279" y="2446928"/>
+            <a:off x="3540405" y="2552276"/>
             <a:ext cx="640080" cy="274320"/>
           </a:xfrm>
           <a:prstGeom prst="rect">
@@ -4089,8 +3945,8 @@
         </p:nvCxnSpPr>
         <p:spPr>
           <a:xfrm flipH="1">
-            <a:off x="4927280" y="1194731"/>
-            <a:ext cx="1106102" cy="651539"/>
+            <a:off x="5220824" y="1015080"/>
+            <a:ext cx="714224" cy="958265"/>
           </a:xfrm>
           <a:prstGeom prst="line">
             <a:avLst/>
@@ -4127,8 +3983,8 @@
         </p:nvCxnSpPr>
         <p:spPr>
           <a:xfrm>
-            <a:off x="6295482" y="1206384"/>
-            <a:ext cx="0" cy="731192"/>
+            <a:off x="6248353" y="1015080"/>
+            <a:ext cx="480911" cy="1706168"/>
           </a:xfrm>
           <a:prstGeom prst="line">
             <a:avLst/>
@@ -4165,8 +4021,8 @@
         </p:nvSpPr>
         <p:spPr>
           <a:xfrm>
-            <a:off x="4302808" y="2531646"/>
-            <a:ext cx="640080" cy="274320"/>
+            <a:off x="4729110" y="2583501"/>
+            <a:ext cx="640080" cy="272773"/>
           </a:xfrm>
           <a:prstGeom prst="rect">
             <a:avLst/>
@@ -4200,7 +4056,7 @@
           <p:nvPr/>
         </p:nvPicPr>
         <p:blipFill>
-          <a:blip r:embed="rId8">
+          <a:blip r:embed="rId7">
             <a:extLst>
               <a:ext uri="{28A0092B-C50C-407E-A947-70E740481C1C}">
                 <a14:useLocalDpi xmlns:a14="http://schemas.microsoft.com/office/drawing/2010/main" val="0"/>
@@ -4213,7 +4069,7 @@
         </p:blipFill>
         <p:spPr>
           <a:xfrm>
-            <a:off x="5894085" y="1897794"/>
+            <a:off x="6519110" y="2754979"/>
             <a:ext cx="543639" cy="564958"/>
           </a:xfrm>
           <a:prstGeom prst="rect">
@@ -4229,14 +4085,14 @@
         </p:nvCxnSpPr>
         <p:spPr>
           <a:xfrm flipH="1">
-            <a:off x="3799619" y="2365338"/>
-            <a:ext cx="2205255" cy="1332700"/>
+            <a:off x="5143724" y="3173673"/>
+            <a:ext cx="1435501" cy="739204"/>
           </a:xfrm>
           <a:prstGeom prst="straightConnector1">
             <a:avLst/>
           </a:prstGeom>
           <a:ln w="19050">
-            <a:tailEnd type="triangle"/>
+            <a:tailEnd type="none"/>
           </a:ln>
           <a:effectLst>
             <a:outerShdw blurRad="50800" dist="38100" dir="2700000" algn="ctr" rotWithShape="0">
@@ -4269,7 +4125,7 @@
         </p:nvSpPr>
         <p:spPr>
           <a:xfrm>
-            <a:off x="6573197" y="2011119"/>
+            <a:off x="6337630" y="3361464"/>
             <a:ext cx="865690" cy="400110"/>
           </a:xfrm>
           <a:prstGeom prst="rect">
@@ -4307,7 +4163,7 @@
         </p:nvGrpSpPr>
         <p:grpSpPr>
           <a:xfrm>
-            <a:off x="4436581" y="3460435"/>
+            <a:off x="3088424" y="3924687"/>
             <a:ext cx="1044070" cy="920869"/>
             <a:chOff x="4260056" y="4040678"/>
             <a:chExt cx="1044070" cy="920869"/>
@@ -4322,7 +4178,7 @@
             <p:nvPr/>
           </p:nvPicPr>
           <p:blipFill>
-            <a:blip r:embed="rId6">
+            <a:blip r:embed="rId5">
               <a:extLst>
                 <a:ext uri="{28A0092B-C50C-407E-A947-70E740481C1C}">
                   <a14:useLocalDpi xmlns:a14="http://schemas.microsoft.com/office/drawing/2010/main" val="0"/>
@@ -4392,7 +4248,7 @@
           <p:nvPr/>
         </p:nvPicPr>
         <p:blipFill>
-          <a:blip r:embed="rId6">
+          <a:blip r:embed="rId5">
             <a:extLst>
               <a:ext uri="{28A0092B-C50C-407E-A947-70E740481C1C}">
                 <a14:useLocalDpi xmlns:a14="http://schemas.microsoft.com/office/drawing/2010/main" val="0"/>
@@ -4405,7 +4261,7 @@
         </p:blipFill>
         <p:spPr>
           <a:xfrm>
-            <a:off x="4363671" y="1846270"/>
+            <a:off x="4781526" y="1985146"/>
             <a:ext cx="544782" cy="564959"/>
           </a:xfrm>
           <a:prstGeom prst="rect">
@@ -4413,222 +4269,6 @@
           </a:prstGeom>
         </p:spPr>
       </p:pic>
-      <p:grpSp>
-        <p:nvGrpSpPr>
-          <p:cNvPr id="8" name="Group 7"/>
-          <p:cNvGrpSpPr/>
-          <p:nvPr/>
-        </p:nvGrpSpPr>
-        <p:grpSpPr>
-          <a:xfrm>
-            <a:off x="3023287" y="4533038"/>
-            <a:ext cx="2317771" cy="930915"/>
-            <a:chOff x="3171007" y="4438261"/>
-            <a:chExt cx="2317771" cy="930915"/>
-          </a:xfrm>
-        </p:grpSpPr>
-        <p:sp>
-          <p:nvSpPr>
-            <p:cNvPr id="66" name="Rounded Rectangle 65"/>
-            <p:cNvSpPr/>
-            <p:nvPr/>
-          </p:nvSpPr>
-          <p:spPr>
-            <a:xfrm>
-              <a:off x="3171007" y="4438261"/>
-              <a:ext cx="2317771" cy="930915"/>
-            </a:xfrm>
-            <a:prstGeom prst="roundRect">
-              <a:avLst>
-                <a:gd name="adj" fmla="val 9818"/>
-              </a:avLst>
-            </a:prstGeom>
-            <a:solidFill>
-              <a:srgbClr val="D2D9CA">
-                <a:alpha val="50000"/>
-              </a:srgbClr>
-            </a:solidFill>
-            <a:ln w="19050">
-              <a:solidFill>
-                <a:schemeClr val="tx1"/>
-              </a:solidFill>
-              <a:prstDash val="dashDot"/>
-            </a:ln>
-            <a:effectLst/>
-          </p:spPr>
-          <p:style>
-            <a:lnRef idx="1">
-              <a:schemeClr val="accent1"/>
-            </a:lnRef>
-            <a:fillRef idx="3">
-              <a:schemeClr val="accent1"/>
-            </a:fillRef>
-            <a:effectRef idx="2">
-              <a:schemeClr val="accent1"/>
-            </a:effectRef>
-            <a:fontRef idx="minor">
-              <a:schemeClr val="lt1"/>
-            </a:fontRef>
-          </p:style>
-          <p:txBody>
-            <a:bodyPr anchor="ctr"/>
-            <a:lstStyle/>
-            <a:p>
-              <a:pPr algn="ctr">
-                <a:defRPr/>
-              </a:pPr>
-              <a:endParaRPr lang="en-US" sz="1400" dirty="0">
-                <a:solidFill>
-                  <a:schemeClr val="tx1"/>
-                </a:solidFill>
-                <a:latin typeface="Helvetica Neue"/>
-                <a:cs typeface="Helvetica Neue"/>
-              </a:endParaRPr>
-            </a:p>
-          </p:txBody>
-        </p:sp>
-        <p:sp>
-          <p:nvSpPr>
-            <p:cNvPr id="77" name="TextBox 76"/>
-            <p:cNvSpPr txBox="1"/>
-            <p:nvPr/>
-          </p:nvSpPr>
-          <p:spPr>
-            <a:xfrm>
-              <a:off x="4728973" y="5052939"/>
-              <a:ext cx="615780" cy="255670"/>
-            </a:xfrm>
-            <a:prstGeom prst="rect">
-              <a:avLst/>
-            </a:prstGeom>
-            <a:noFill/>
-          </p:spPr>
-          <p:txBody>
-            <a:bodyPr wrap="square" lIns="0" tIns="0" rIns="0" bIns="0" rtlCol="0" anchor="t">
-              <a:noAutofit/>
-            </a:bodyPr>
-            <a:lstStyle/>
-            <a:p>
-              <a:pPr algn="ctr"/>
-              <a:r>
-                <a:rPr lang="en-US" sz="1000" b="1" dirty="0" smtClean="0">
-                  <a:latin typeface="Verdana" panose="020B0604030504040204" pitchFamily="34" charset="0"/>
-                  <a:ea typeface="Verdana" panose="020B0604030504040204" pitchFamily="34" charset="0"/>
-                  <a:cs typeface="Verdana" panose="020B0604030504040204" pitchFamily="34" charset="0"/>
-                </a:rPr>
-                <a:t>CAS Workers</a:t>
-              </a:r>
-              <a:endParaRPr lang="en-US" sz="1000" b="1" dirty="0">
-                <a:latin typeface="Verdana" panose="020B0604030504040204" pitchFamily="34" charset="0"/>
-                <a:ea typeface="Verdana" panose="020B0604030504040204" pitchFamily="34" charset="0"/>
-                <a:cs typeface="Verdana" panose="020B0604030504040204" pitchFamily="34" charset="0"/>
-              </a:endParaRPr>
-            </a:p>
-          </p:txBody>
-        </p:sp>
-        <p:sp>
-          <p:nvSpPr>
-            <p:cNvPr id="78" name="TextBox 77"/>
-            <p:cNvSpPr txBox="1"/>
-            <p:nvPr/>
-          </p:nvSpPr>
-          <p:spPr>
-            <a:xfrm>
-              <a:off x="3250701" y="5135557"/>
-              <a:ext cx="1420898" cy="177747"/>
-            </a:xfrm>
-            <a:prstGeom prst="rect">
-              <a:avLst/>
-            </a:prstGeom>
-            <a:noFill/>
-          </p:spPr>
-          <p:txBody>
-            <a:bodyPr wrap="square" lIns="0" tIns="0" rIns="0" bIns="0" rtlCol="0" anchor="t">
-              <a:noAutofit/>
-            </a:bodyPr>
-            <a:lstStyle/>
-            <a:p>
-              <a:pPr algn="ctr"/>
-              <a:r>
-                <a:rPr lang="en-US" sz="1000" b="1" dirty="0" smtClean="0">
-                  <a:latin typeface="Verdana" panose="020B0604030504040204" pitchFamily="34" charset="0"/>
-                  <a:ea typeface="Verdana" panose="020B0604030504040204" pitchFamily="34" charset="0"/>
-                  <a:cs typeface="Verdana" panose="020B0604030504040204" pitchFamily="34" charset="0"/>
-                </a:rPr>
-                <a:t>Auto </a:t>
-              </a:r>
-              <a:r>
-                <a:rPr lang="en-US" sz="1000" b="1" dirty="0">
-                  <a:latin typeface="Verdana" panose="020B0604030504040204" pitchFamily="34" charset="0"/>
-                  <a:ea typeface="Verdana" panose="020B0604030504040204" pitchFamily="34" charset="0"/>
-                  <a:cs typeface="Verdana" panose="020B0604030504040204" pitchFamily="34" charset="0"/>
-                </a:rPr>
-                <a:t>Scaling group</a:t>
-              </a:r>
-            </a:p>
-          </p:txBody>
-        </p:sp>
-        <p:pic>
-          <p:nvPicPr>
-            <p:cNvPr id="79" name="Picture 78"/>
-            <p:cNvPicPr>
-              <a:picLocks noChangeAspect="1"/>
-            </p:cNvPicPr>
-            <p:nvPr/>
-          </p:nvPicPr>
-          <p:blipFill>
-            <a:blip r:embed="rId9">
-              <a:extLst>
-                <a:ext uri="{28A0092B-C50C-407E-A947-70E740481C1C}">
-                  <a14:useLocalDpi xmlns:a14="http://schemas.microsoft.com/office/drawing/2010/main" val="0"/>
-                </a:ext>
-              </a:extLst>
-            </a:blip>
-            <a:stretch>
-              <a:fillRect/>
-            </a:stretch>
-          </p:blipFill>
-          <p:spPr>
-            <a:xfrm>
-              <a:off x="3619406" y="4489088"/>
-              <a:ext cx="524099" cy="493642"/>
-            </a:xfrm>
-            <a:prstGeom prst="rect">
-              <a:avLst/>
-            </a:prstGeom>
-          </p:spPr>
-        </p:pic>
-        <p:pic>
-          <p:nvPicPr>
-            <p:cNvPr id="80" name="Picture 79"/>
-            <p:cNvPicPr>
-              <a:picLocks noChangeAspect="1"/>
-            </p:cNvPicPr>
-            <p:nvPr/>
-          </p:nvPicPr>
-          <p:blipFill>
-            <a:blip r:embed="rId10">
-              <a:extLst>
-                <a:ext uri="{28A0092B-C50C-407E-A947-70E740481C1C}">
-                  <a14:useLocalDpi xmlns:a14="http://schemas.microsoft.com/office/drawing/2010/main" val="0"/>
-                </a:ext>
-              </a:extLst>
-            </a:blip>
-            <a:stretch>
-              <a:fillRect/>
-            </a:stretch>
-          </p:blipFill>
-          <p:spPr>
-            <a:xfrm>
-              <a:off x="4825933" y="4489090"/>
-              <a:ext cx="421861" cy="431402"/>
-            </a:xfrm>
-            <a:prstGeom prst="rect">
-              <a:avLst/>
-            </a:prstGeom>
-          </p:spPr>
-        </p:pic>
-      </p:grpSp>
       <p:grpSp>
         <p:nvGrpSpPr>
           <p:cNvPr id="3" name="Group 2"/>
@@ -4637,7 +4277,7 @@
         </p:nvGrpSpPr>
         <p:grpSpPr>
           <a:xfrm>
-            <a:off x="10015919" y="3164228"/>
+            <a:off x="388555" y="1344443"/>
             <a:ext cx="1053379" cy="1106701"/>
             <a:chOff x="10015919" y="3164228"/>
             <a:chExt cx="1053379" cy="1106701"/>
@@ -4652,7 +4292,7 @@
             <p:nvPr/>
           </p:nvPicPr>
           <p:blipFill>
-            <a:blip r:embed="rId11">
+            <a:blip r:embed="rId8">
               <a:extLst>
                 <a:ext uri="{28A0092B-C50C-407E-A947-70E740481C1C}">
                   <a14:useLocalDpi xmlns:a14="http://schemas.microsoft.com/office/drawing/2010/main" val="0"/>
@@ -4720,6 +4360,51 @@
           </p:txBody>
         </p:sp>
       </p:grpSp>
+      <p:sp>
+        <p:nvSpPr>
+          <p:cNvPr id="67" name="TextBox 66"/>
+          <p:cNvSpPr txBox="1"/>
+          <p:nvPr/>
+        </p:nvSpPr>
+        <p:spPr>
+          <a:xfrm>
+            <a:off x="3445674" y="5732436"/>
+            <a:ext cx="1539606" cy="139780"/>
+          </a:xfrm>
+          <a:prstGeom prst="rect">
+            <a:avLst/>
+          </a:prstGeom>
+          <a:noFill/>
+        </p:spPr>
+        <p:txBody>
+          <a:bodyPr wrap="square" lIns="0" tIns="0" rIns="0" bIns="0" rtlCol="0" anchor="t">
+            <a:noAutofit/>
+          </a:bodyPr>
+          <a:lstStyle/>
+          <a:p>
+            <a:pPr algn="ctr"/>
+            <a:r>
+              <a:rPr lang="en-US" sz="1100" b="1" dirty="0" err="1" smtClean="0">
+                <a:solidFill>
+                  <a:srgbClr val="FAA634"/>
+                </a:solidFill>
+                <a:latin typeface="Verdana" panose="020B0604030504040204" pitchFamily="34" charset="0"/>
+                <a:ea typeface="Verdana" panose="020B0604030504040204" pitchFamily="34" charset="0"/>
+                <a:cs typeface="Verdana" panose="020B0604030504040204" pitchFamily="34" charset="0"/>
+              </a:rPr>
+              <a:t>AvailabilityZone</a:t>
+            </a:r>
+            <a:endParaRPr lang="en-US" sz="1100" b="1" dirty="0">
+              <a:solidFill>
+                <a:srgbClr val="FAA634"/>
+              </a:solidFill>
+              <a:latin typeface="Verdana" panose="020B0604030504040204" pitchFamily="34" charset="0"/>
+              <a:ea typeface="Verdana" panose="020B0604030504040204" pitchFamily="34" charset="0"/>
+              <a:cs typeface="Verdana" panose="020B0604030504040204" pitchFamily="34" charset="0"/>
+            </a:endParaRPr>
+          </a:p>
+        </p:txBody>
+      </p:sp>
     </p:spTree>
     <p:extLst>
       <p:ext uri="{BB962C8B-B14F-4D97-AF65-F5344CB8AC3E}">

</xml_diff>

<commit_message>
straighted out the lines in the architecture diagram
</commit_message>
<xml_diff>
--- a/doc/Quick Start architecture diagram.pptx
+++ b/doc/Quick Start architecture diagram.pptx
@@ -243,7 +243,7 @@
           <a:p>
             <a:fld id="{5075756A-E1AA-F843-BF52-05C1433C8A91}" type="datetimeFigureOut">
               <a:rPr lang="en-US" smtClean="0"/>
-              <a:t>9/7/2017</a:t>
+              <a:t>9/12/2017</a:t>
             </a:fld>
             <a:endParaRPr lang="en-US"/>
           </a:p>
@@ -413,7 +413,7 @@
           <a:p>
             <a:fld id="{5075756A-E1AA-F843-BF52-05C1433C8A91}" type="datetimeFigureOut">
               <a:rPr lang="en-US" smtClean="0"/>
-              <a:t>9/7/2017</a:t>
+              <a:t>9/12/2017</a:t>
             </a:fld>
             <a:endParaRPr lang="en-US"/>
           </a:p>
@@ -593,7 +593,7 @@
           <a:p>
             <a:fld id="{5075756A-E1AA-F843-BF52-05C1433C8A91}" type="datetimeFigureOut">
               <a:rPr lang="en-US" smtClean="0"/>
-              <a:t>9/7/2017</a:t>
+              <a:t>9/12/2017</a:t>
             </a:fld>
             <a:endParaRPr lang="en-US"/>
           </a:p>
@@ -763,7 +763,7 @@
           <a:p>
             <a:fld id="{5075756A-E1AA-F843-BF52-05C1433C8A91}" type="datetimeFigureOut">
               <a:rPr lang="en-US" smtClean="0"/>
-              <a:t>9/7/2017</a:t>
+              <a:t>9/12/2017</a:t>
             </a:fld>
             <a:endParaRPr lang="en-US"/>
           </a:p>
@@ -1009,7 +1009,7 @@
           <a:p>
             <a:fld id="{5075756A-E1AA-F843-BF52-05C1433C8A91}" type="datetimeFigureOut">
               <a:rPr lang="en-US" smtClean="0"/>
-              <a:t>9/7/2017</a:t>
+              <a:t>9/12/2017</a:t>
             </a:fld>
             <a:endParaRPr lang="en-US"/>
           </a:p>
@@ -1241,7 +1241,7 @@
           <a:p>
             <a:fld id="{5075756A-E1AA-F843-BF52-05C1433C8A91}" type="datetimeFigureOut">
               <a:rPr lang="en-US" smtClean="0"/>
-              <a:t>9/7/2017</a:t>
+              <a:t>9/12/2017</a:t>
             </a:fld>
             <a:endParaRPr lang="en-US"/>
           </a:p>
@@ -1608,7 +1608,7 @@
           <a:p>
             <a:fld id="{5075756A-E1AA-F843-BF52-05C1433C8A91}" type="datetimeFigureOut">
               <a:rPr lang="en-US" smtClean="0"/>
-              <a:t>9/7/2017</a:t>
+              <a:t>9/12/2017</a:t>
             </a:fld>
             <a:endParaRPr lang="en-US"/>
           </a:p>
@@ -1726,7 +1726,7 @@
           <a:p>
             <a:fld id="{5075756A-E1AA-F843-BF52-05C1433C8A91}" type="datetimeFigureOut">
               <a:rPr lang="en-US" smtClean="0"/>
-              <a:t>9/7/2017</a:t>
+              <a:t>9/12/2017</a:t>
             </a:fld>
             <a:endParaRPr lang="en-US"/>
           </a:p>
@@ -1821,7 +1821,7 @@
           <a:p>
             <a:fld id="{5075756A-E1AA-F843-BF52-05C1433C8A91}" type="datetimeFigureOut">
               <a:rPr lang="en-US" smtClean="0"/>
-              <a:t>9/7/2017</a:t>
+              <a:t>9/12/2017</a:t>
             </a:fld>
             <a:endParaRPr lang="en-US"/>
           </a:p>
@@ -2098,7 +2098,7 @@
           <a:p>
             <a:fld id="{5075756A-E1AA-F843-BF52-05C1433C8A91}" type="datetimeFigureOut">
               <a:rPr lang="en-US" smtClean="0"/>
-              <a:t>9/7/2017</a:t>
+              <a:t>9/12/2017</a:t>
             </a:fld>
             <a:endParaRPr lang="en-US"/>
           </a:p>
@@ -2351,7 +2351,7 @@
           <a:p>
             <a:fld id="{5075756A-E1AA-F843-BF52-05C1433C8A91}" type="datetimeFigureOut">
               <a:rPr lang="en-US" smtClean="0"/>
-              <a:t>9/7/2017</a:t>
+              <a:t>9/12/2017</a:t>
             </a:fld>
             <a:endParaRPr lang="en-US"/>
           </a:p>
@@ -2564,7 +2564,7 @@
           <a:p>
             <a:fld id="{5075756A-E1AA-F843-BF52-05C1433C8A91}" type="datetimeFigureOut">
               <a:rPr lang="en-US" smtClean="0"/>
-              <a:t>9/7/2017</a:t>
+              <a:t>9/12/2017</a:t>
             </a:fld>
             <a:endParaRPr lang="en-US"/>
           </a:p>
@@ -3248,7 +3248,7 @@
         </p:nvSpPr>
         <p:spPr>
           <a:xfrm>
-            <a:off x="2973837" y="1457513"/>
+            <a:off x="2936979" y="1457513"/>
             <a:ext cx="2789564" cy="1821967"/>
           </a:xfrm>
           <a:prstGeom prst="roundRect">
@@ -3390,7 +3390,7 @@
         </p:blipFill>
         <p:spPr>
           <a:xfrm>
-            <a:off x="5838586" y="458135"/>
+            <a:off x="6501074" y="461593"/>
             <a:ext cx="579710" cy="603531"/>
           </a:xfrm>
           <a:prstGeom prst="rect">
@@ -3945,8 +3945,8 @@
         </p:nvCxnSpPr>
         <p:spPr>
           <a:xfrm flipH="1">
-            <a:off x="5220824" y="1015080"/>
-            <a:ext cx="714224" cy="958265"/>
+            <a:off x="5050235" y="1065124"/>
+            <a:ext cx="1580225" cy="875996"/>
           </a:xfrm>
           <a:prstGeom prst="line">
             <a:avLst/>
@@ -3983,8 +3983,8 @@
         </p:nvCxnSpPr>
         <p:spPr>
           <a:xfrm>
-            <a:off x="6248353" y="1015080"/>
-            <a:ext cx="480911" cy="1706168"/>
+            <a:off x="6785990" y="1085888"/>
+            <a:ext cx="9125" cy="1634397"/>
           </a:xfrm>
           <a:prstGeom prst="line">
             <a:avLst/>

</xml_diff>